<commit_message>
final update for the presentation
</commit_message>
<xml_diff>
--- a/Planitapp presentation.pptx
+++ b/Planitapp presentation.pptx
@@ -1445,7 +1445,7 @@
       </p:grpSpPr>
       <p:sp>
         <p:nvSpPr>
-          <p:cNvPr id="107" name="Google Shape;107;p3:notes"/>
+          <p:cNvPr id="107" name="Google Shape;107;p4:notes"/>
           <p:cNvSpPr txBox="1"/>
           <p:nvPr>
             <p:ph idx="1" type="body"/>
@@ -1492,7 +1492,7 @@
       </p:sp>
       <p:sp>
         <p:nvSpPr>
-          <p:cNvPr id="108" name="Google Shape;108;p3:notes"/>
+          <p:cNvPr id="108" name="Google Shape;108;p4:notes"/>
           <p:cNvSpPr/>
           <p:nvPr>
             <p:ph idx="2" type="sldImg"/>
@@ -1548,7 +1548,7 @@
   <p:cSld>
     <p:spTree>
       <p:nvGrpSpPr>
-        <p:cNvPr id="120" name="Shape 120"/>
+        <p:cNvPr id="127" name="Shape 127"/>
         <p:cNvGrpSpPr/>
         <p:nvPr/>
       </p:nvGrpSpPr>
@@ -1562,7 +1562,7 @@
       </p:grpSpPr>
       <p:sp>
         <p:nvSpPr>
-          <p:cNvPr id="121" name="Google Shape;121;p4:notes"/>
+          <p:cNvPr id="128" name="Google Shape;128;p5:notes"/>
           <p:cNvSpPr txBox="1"/>
           <p:nvPr>
             <p:ph idx="1" type="body"/>
@@ -1609,7 +1609,7 @@
       </p:sp>
       <p:sp>
         <p:nvSpPr>
-          <p:cNvPr id="122" name="Google Shape;122;p4:notes"/>
+          <p:cNvPr id="129" name="Google Shape;129;p5:notes"/>
           <p:cNvSpPr/>
           <p:nvPr>
             <p:ph idx="2" type="sldImg"/>
@@ -1665,7 +1665,7 @@
   <p:cSld>
     <p:spTree>
       <p:nvGrpSpPr>
-        <p:cNvPr id="141" name="Shape 141"/>
+        <p:cNvPr id="139" name="Shape 139"/>
         <p:cNvGrpSpPr/>
         <p:nvPr/>
       </p:nvGrpSpPr>
@@ -1679,7 +1679,7 @@
       </p:grpSpPr>
       <p:sp>
         <p:nvSpPr>
-          <p:cNvPr id="142" name="Google Shape;142;p5:notes"/>
+          <p:cNvPr id="140" name="Google Shape;140;p3:notes"/>
           <p:cNvSpPr txBox="1"/>
           <p:nvPr>
             <p:ph idx="1" type="body"/>
@@ -1726,7 +1726,7 @@
       </p:sp>
       <p:sp>
         <p:nvSpPr>
-          <p:cNvPr id="143" name="Google Shape;143;p5:notes"/>
+          <p:cNvPr id="141" name="Google Shape;141;p3:notes"/>
           <p:cNvSpPr/>
           <p:nvPr>
             <p:ph idx="2" type="sldImg"/>
@@ -18062,639 +18062,29 @@
       <p:sp>
         <p:nvSpPr>
           <p:cNvPr id="112" name="Google Shape;112;p15"/>
-          <p:cNvSpPr txBox="1"/>
-          <p:nvPr/>
-        </p:nvSpPr>
-        <p:spPr>
-          <a:xfrm>
-            <a:off x="6762600" y="350600"/>
-            <a:ext cx="4762800" cy="1108200"/>
-          </a:xfrm>
-          <a:prstGeom prst="rect">
-            <a:avLst/>
-          </a:prstGeom>
-          <a:noFill/>
-          <a:ln>
-            <a:noFill/>
-          </a:ln>
-        </p:spPr>
-        <p:txBody>
-          <a:bodyPr anchorCtr="0" anchor="t" bIns="0" lIns="0" spcFirstLastPara="1" rIns="0" wrap="square" tIns="0">
-            <a:spAutoFit/>
-          </a:bodyPr>
-          <a:lstStyle/>
-          <a:p>
-            <a:pPr indent="0" lvl="0" marL="0" marR="0" rtl="0" algn="ctr">
-              <a:lnSpc>
-                <a:spcPct val="140000"/>
-              </a:lnSpc>
-              <a:spcBef>
-                <a:spcPts val="0"/>
-              </a:spcBef>
-              <a:spcAft>
-                <a:spcPts val="0"/>
-              </a:spcAft>
-              <a:buClr>
-                <a:srgbClr val="000000"/>
-              </a:buClr>
-              <a:buSzPts val="7200"/>
-              <a:buFont typeface="Arial"/>
-              <a:buNone/>
-            </a:pPr>
-            <a:r>
-              <a:rPr b="1" i="0" lang="en-US" sz="7200" u="none" cap="none" strike="noStrike">
-                <a:solidFill>
-                  <a:srgbClr val="44CA84"/>
-                </a:solidFill>
-                <a:latin typeface="Open Sans"/>
-                <a:ea typeface="Open Sans"/>
-                <a:cs typeface="Open Sans"/>
-                <a:sym typeface="Open Sans"/>
-              </a:rPr>
-              <a:t>Funkciók</a:t>
-            </a:r>
-            <a:endParaRPr b="0" i="0" sz="1400" u="none" cap="none" strike="noStrike">
-              <a:solidFill>
-                <a:srgbClr val="000000"/>
-              </a:solidFill>
-              <a:latin typeface="Arial"/>
-              <a:ea typeface="Arial"/>
-              <a:cs typeface="Arial"/>
-              <a:sym typeface="Arial"/>
-            </a:endParaRPr>
-          </a:p>
-        </p:txBody>
-      </p:sp>
-      <p:sp>
-        <p:nvSpPr>
-          <p:cNvPr id="113" name="Google Shape;113;p15"/>
-          <p:cNvSpPr txBox="1"/>
-          <p:nvPr/>
-        </p:nvSpPr>
-        <p:spPr>
-          <a:xfrm>
-            <a:off x="3062802" y="2501746"/>
-            <a:ext cx="13707600" cy="492600"/>
-          </a:xfrm>
-          <a:prstGeom prst="rect">
-            <a:avLst/>
-          </a:prstGeom>
-          <a:noFill/>
-          <a:ln>
-            <a:noFill/>
-          </a:ln>
-        </p:spPr>
-        <p:txBody>
-          <a:bodyPr anchorCtr="0" anchor="t" bIns="0" lIns="0" spcFirstLastPara="1" rIns="0" wrap="square" tIns="0">
-            <a:spAutoFit/>
-          </a:bodyPr>
-          <a:lstStyle/>
-          <a:p>
-            <a:pPr indent="0" lvl="0" marL="0" marR="0" rtl="0" algn="l">
-              <a:lnSpc>
-                <a:spcPct val="140000"/>
-              </a:lnSpc>
-              <a:spcBef>
-                <a:spcPts val="0"/>
-              </a:spcBef>
-              <a:spcAft>
-                <a:spcPts val="0"/>
-              </a:spcAft>
-              <a:buClr>
-                <a:srgbClr val="000000"/>
-              </a:buClr>
-              <a:buSzPts val="3200"/>
-              <a:buFont typeface="Arial"/>
-              <a:buNone/>
-            </a:pPr>
-            <a:r>
-              <a:rPr b="0" i="0" lang="en-US" sz="3200" u="none" cap="none" strike="noStrike">
-                <a:solidFill>
-                  <a:srgbClr val="000000"/>
-                </a:solidFill>
-                <a:latin typeface="Open Sans"/>
-                <a:ea typeface="Open Sans"/>
-                <a:cs typeface="Open Sans"/>
-                <a:sym typeface="Open Sans"/>
-              </a:rPr>
-              <a:t>Autentikáció</a:t>
-            </a:r>
-            <a:endParaRPr b="0" i="0" sz="1400" u="none" cap="none" strike="noStrike">
-              <a:solidFill>
-                <a:srgbClr val="000000"/>
-              </a:solidFill>
-              <a:latin typeface="Arial"/>
-              <a:ea typeface="Arial"/>
-              <a:cs typeface="Arial"/>
-              <a:sym typeface="Arial"/>
-            </a:endParaRPr>
-          </a:p>
-        </p:txBody>
-      </p:sp>
-      <p:sp>
-        <p:nvSpPr>
-          <p:cNvPr id="114" name="Google Shape;114;p15"/>
-          <p:cNvSpPr txBox="1"/>
-          <p:nvPr/>
-        </p:nvSpPr>
-        <p:spPr>
-          <a:xfrm>
-            <a:off x="3839573" y="3118774"/>
-            <a:ext cx="8623800" cy="1182000"/>
-          </a:xfrm>
-          <a:prstGeom prst="rect">
-            <a:avLst/>
-          </a:prstGeom>
-          <a:noFill/>
-          <a:ln>
-            <a:noFill/>
-          </a:ln>
-        </p:spPr>
-        <p:txBody>
-          <a:bodyPr anchorCtr="0" anchor="t" bIns="0" lIns="0" spcFirstLastPara="1" rIns="0" wrap="square" tIns="0">
-            <a:spAutoFit/>
-          </a:bodyPr>
-          <a:lstStyle/>
-          <a:p>
-            <a:pPr indent="-345445" lvl="1" marL="690890" marR="0" rtl="0" algn="l">
-              <a:lnSpc>
-                <a:spcPct val="140000"/>
-              </a:lnSpc>
-              <a:spcBef>
-                <a:spcPts val="0"/>
-              </a:spcBef>
-              <a:spcAft>
-                <a:spcPts val="0"/>
-              </a:spcAft>
-              <a:buClr>
-                <a:srgbClr val="000000"/>
-              </a:buClr>
-              <a:buSzPts val="3200"/>
-              <a:buFont typeface="Arial"/>
-              <a:buChar char="•"/>
-            </a:pPr>
-            <a:r>
-              <a:rPr b="1" i="0" lang="en-US" sz="3200" u="none" cap="none" strike="noStrike">
-                <a:solidFill>
-                  <a:srgbClr val="000000"/>
-                </a:solidFill>
-                <a:latin typeface="Open Sans"/>
-                <a:ea typeface="Open Sans"/>
-                <a:cs typeface="Open Sans"/>
-                <a:sym typeface="Open Sans"/>
-              </a:rPr>
-              <a:t>regisztráció</a:t>
-            </a:r>
-            <a:endParaRPr b="0" i="0" sz="1400" u="none" cap="none" strike="noStrike">
-              <a:solidFill>
-                <a:srgbClr val="000000"/>
-              </a:solidFill>
-              <a:latin typeface="Arial"/>
-              <a:ea typeface="Arial"/>
-              <a:cs typeface="Arial"/>
-              <a:sym typeface="Arial"/>
-            </a:endParaRPr>
-          </a:p>
-          <a:p>
-            <a:pPr indent="-345445" lvl="1" marL="690890" marR="0" rtl="0" algn="l">
-              <a:lnSpc>
-                <a:spcPct val="140000"/>
-              </a:lnSpc>
-              <a:spcBef>
-                <a:spcPts val="0"/>
-              </a:spcBef>
-              <a:spcAft>
-                <a:spcPts val="0"/>
-              </a:spcAft>
-              <a:buClr>
-                <a:srgbClr val="000000"/>
-              </a:buClr>
-              <a:buSzPts val="3200"/>
-              <a:buFont typeface="Arial"/>
-              <a:buChar char="•"/>
-            </a:pPr>
-            <a:r>
-              <a:rPr b="1" i="0" lang="en-US" sz="3200" u="none" cap="none" strike="noStrike">
-                <a:solidFill>
-                  <a:srgbClr val="000000"/>
-                </a:solidFill>
-                <a:latin typeface="Open Sans"/>
-                <a:ea typeface="Open Sans"/>
-                <a:cs typeface="Open Sans"/>
-                <a:sym typeface="Open Sans"/>
-              </a:rPr>
-              <a:t>bejelentkezés</a:t>
-            </a:r>
-            <a:endParaRPr b="0" i="0" sz="1400" u="none" cap="none" strike="noStrike">
-              <a:solidFill>
-                <a:srgbClr val="000000"/>
-              </a:solidFill>
-              <a:latin typeface="Arial"/>
-              <a:ea typeface="Arial"/>
-              <a:cs typeface="Arial"/>
-              <a:sym typeface="Arial"/>
-            </a:endParaRPr>
-          </a:p>
-        </p:txBody>
-      </p:sp>
-      <p:sp>
-        <p:nvSpPr>
-          <p:cNvPr id="115" name="Google Shape;115;p15"/>
-          <p:cNvSpPr txBox="1"/>
-          <p:nvPr/>
-        </p:nvSpPr>
-        <p:spPr>
-          <a:xfrm>
-            <a:off x="3062802" y="4425204"/>
-            <a:ext cx="13707597" cy="537844"/>
-          </a:xfrm>
-          <a:prstGeom prst="rect">
-            <a:avLst/>
-          </a:prstGeom>
-          <a:noFill/>
-          <a:ln>
-            <a:noFill/>
-          </a:ln>
-        </p:spPr>
-        <p:txBody>
-          <a:bodyPr anchorCtr="0" anchor="t" bIns="0" lIns="0" spcFirstLastPara="1" rIns="0" wrap="square" tIns="0">
-            <a:spAutoFit/>
-          </a:bodyPr>
-          <a:lstStyle/>
-          <a:p>
-            <a:pPr indent="0" lvl="0" marL="0" marR="0" rtl="0" algn="l">
-              <a:lnSpc>
-                <a:spcPct val="140000"/>
-              </a:lnSpc>
-              <a:spcBef>
-                <a:spcPts val="0"/>
-              </a:spcBef>
-              <a:spcAft>
-                <a:spcPts val="0"/>
-              </a:spcAft>
-              <a:buClr>
-                <a:srgbClr val="000000"/>
-              </a:buClr>
-              <a:buSzPts val="3200"/>
-              <a:buFont typeface="Arial"/>
-              <a:buNone/>
-            </a:pPr>
-            <a:r>
-              <a:rPr b="0" i="0" lang="en-US" sz="3200" u="none" cap="none" strike="noStrike">
-                <a:solidFill>
-                  <a:srgbClr val="000000"/>
-                </a:solidFill>
-                <a:latin typeface="Open Sans"/>
-                <a:ea typeface="Open Sans"/>
-                <a:cs typeface="Open Sans"/>
-                <a:sym typeface="Open Sans"/>
-              </a:rPr>
-              <a:t>Fő funkciók</a:t>
-            </a:r>
-            <a:endParaRPr b="0" i="0" sz="1400" u="none" cap="none" strike="noStrike">
-              <a:solidFill>
-                <a:srgbClr val="000000"/>
-              </a:solidFill>
-              <a:latin typeface="Arial"/>
-              <a:ea typeface="Arial"/>
-              <a:cs typeface="Arial"/>
-              <a:sym typeface="Arial"/>
-            </a:endParaRPr>
-          </a:p>
-        </p:txBody>
-      </p:sp>
-      <p:sp>
-        <p:nvSpPr>
-          <p:cNvPr id="116" name="Google Shape;116;p15"/>
-          <p:cNvSpPr txBox="1"/>
-          <p:nvPr/>
-        </p:nvSpPr>
-        <p:spPr>
-          <a:xfrm>
-            <a:off x="3839573" y="5020198"/>
-            <a:ext cx="8623746" cy="3909694"/>
-          </a:xfrm>
-          <a:prstGeom prst="rect">
-            <a:avLst/>
-          </a:prstGeom>
-          <a:noFill/>
-          <a:ln>
-            <a:noFill/>
-          </a:ln>
-        </p:spPr>
-        <p:txBody>
-          <a:bodyPr anchorCtr="0" anchor="t" bIns="0" lIns="0" spcFirstLastPara="1" rIns="0" wrap="square" tIns="0">
-            <a:spAutoFit/>
-          </a:bodyPr>
-          <a:lstStyle/>
-          <a:p>
-            <a:pPr indent="-345445" lvl="1" marL="690890" marR="0" rtl="0" algn="l">
-              <a:lnSpc>
-                <a:spcPct val="140000"/>
-              </a:lnSpc>
-              <a:spcBef>
-                <a:spcPts val="0"/>
-              </a:spcBef>
-              <a:spcAft>
-                <a:spcPts val="0"/>
-              </a:spcAft>
-              <a:buClr>
-                <a:srgbClr val="000000"/>
-              </a:buClr>
-              <a:buSzPts val="3200"/>
-              <a:buFont typeface="Arial"/>
-              <a:buChar char="•"/>
-            </a:pPr>
-            <a:r>
-              <a:rPr b="1" i="0" lang="en-US" sz="3200" u="none" cap="none" strike="noStrike">
-                <a:solidFill>
-                  <a:srgbClr val="000000"/>
-                </a:solidFill>
-                <a:latin typeface="Open Sans"/>
-                <a:ea typeface="Open Sans"/>
-                <a:cs typeface="Open Sans"/>
-                <a:sym typeface="Open Sans"/>
-              </a:rPr>
-              <a:t>analitikák megtekintése</a:t>
-            </a:r>
-            <a:endParaRPr b="0" i="0" sz="1400" u="none" cap="none" strike="noStrike">
-              <a:solidFill>
-                <a:srgbClr val="000000"/>
-              </a:solidFill>
-              <a:latin typeface="Arial"/>
-              <a:ea typeface="Arial"/>
-              <a:cs typeface="Arial"/>
-              <a:sym typeface="Arial"/>
-            </a:endParaRPr>
-          </a:p>
-          <a:p>
-            <a:pPr indent="-345445" lvl="1" marL="690890" marR="0" rtl="0" algn="l">
-              <a:lnSpc>
-                <a:spcPct val="140000"/>
-              </a:lnSpc>
-              <a:spcBef>
-                <a:spcPts val="0"/>
-              </a:spcBef>
-              <a:spcAft>
-                <a:spcPts val="0"/>
-              </a:spcAft>
-              <a:buClr>
-                <a:srgbClr val="000000"/>
-              </a:buClr>
-              <a:buSzPts val="3200"/>
-              <a:buFont typeface="Arial"/>
-              <a:buChar char="•"/>
-            </a:pPr>
-            <a:r>
-              <a:rPr b="1" i="0" lang="en-US" sz="3200" u="none" cap="none" strike="noStrike">
-                <a:solidFill>
-                  <a:srgbClr val="000000"/>
-                </a:solidFill>
-                <a:latin typeface="Open Sans"/>
-                <a:ea typeface="Open Sans"/>
-                <a:cs typeface="Open Sans"/>
-                <a:sym typeface="Open Sans"/>
-              </a:rPr>
-              <a:t>projekt létrehozása</a:t>
-            </a:r>
-            <a:endParaRPr b="0" i="0" sz="1400" u="none" cap="none" strike="noStrike">
-              <a:solidFill>
-                <a:srgbClr val="000000"/>
-              </a:solidFill>
-              <a:latin typeface="Arial"/>
-              <a:ea typeface="Arial"/>
-              <a:cs typeface="Arial"/>
-              <a:sym typeface="Arial"/>
-            </a:endParaRPr>
-          </a:p>
-          <a:p>
-            <a:pPr indent="-345445" lvl="1" marL="690890" marR="0" rtl="0" algn="l">
-              <a:lnSpc>
-                <a:spcPct val="140000"/>
-              </a:lnSpc>
-              <a:spcBef>
-                <a:spcPts val="0"/>
-              </a:spcBef>
-              <a:spcAft>
-                <a:spcPts val="0"/>
-              </a:spcAft>
-              <a:buClr>
-                <a:srgbClr val="000000"/>
-              </a:buClr>
-              <a:buSzPts val="3200"/>
-              <a:buFont typeface="Arial"/>
-              <a:buChar char="•"/>
-            </a:pPr>
-            <a:r>
-              <a:rPr b="1" i="0" lang="en-US" sz="3200" u="none" cap="none" strike="noStrike">
-                <a:solidFill>
-                  <a:srgbClr val="000000"/>
-                </a:solidFill>
-                <a:latin typeface="Open Sans"/>
-                <a:ea typeface="Open Sans"/>
-                <a:cs typeface="Open Sans"/>
-                <a:sym typeface="Open Sans"/>
-              </a:rPr>
-              <a:t>feladatok létrehozása és kezelése</a:t>
-            </a:r>
-            <a:endParaRPr b="0" i="0" sz="1400" u="none" cap="none" strike="noStrike">
-              <a:solidFill>
-                <a:srgbClr val="000000"/>
-              </a:solidFill>
-              <a:latin typeface="Arial"/>
-              <a:ea typeface="Arial"/>
-              <a:cs typeface="Arial"/>
-              <a:sym typeface="Arial"/>
-            </a:endParaRPr>
-          </a:p>
-          <a:p>
-            <a:pPr indent="-345445" lvl="1" marL="690890" marR="0" rtl="0" algn="l">
-              <a:lnSpc>
-                <a:spcPct val="140000"/>
-              </a:lnSpc>
-              <a:spcBef>
-                <a:spcPts val="0"/>
-              </a:spcBef>
-              <a:spcAft>
-                <a:spcPts val="0"/>
-              </a:spcAft>
-              <a:buClr>
-                <a:srgbClr val="000000"/>
-              </a:buClr>
-              <a:buSzPts val="3200"/>
-              <a:buFont typeface="Arial"/>
-              <a:buChar char="•"/>
-            </a:pPr>
-            <a:r>
-              <a:rPr b="1" i="0" lang="en-US" sz="3200" u="none" cap="none" strike="noStrike">
-                <a:solidFill>
-                  <a:srgbClr val="000000"/>
-                </a:solidFill>
-                <a:latin typeface="Open Sans"/>
-                <a:ea typeface="Open Sans"/>
-                <a:cs typeface="Open Sans"/>
-                <a:sym typeface="Open Sans"/>
-              </a:rPr>
-              <a:t>csevegő felület</a:t>
-            </a:r>
-            <a:endParaRPr b="0" i="0" sz="1400" u="none" cap="none" strike="noStrike">
-              <a:solidFill>
-                <a:srgbClr val="000000"/>
-              </a:solidFill>
-              <a:latin typeface="Arial"/>
-              <a:ea typeface="Arial"/>
-              <a:cs typeface="Arial"/>
-              <a:sym typeface="Arial"/>
-            </a:endParaRPr>
-          </a:p>
-          <a:p>
-            <a:pPr indent="-345445" lvl="1" marL="690890" marR="0" rtl="0" algn="l">
-              <a:lnSpc>
-                <a:spcPct val="140000"/>
-              </a:lnSpc>
-              <a:spcBef>
-                <a:spcPts val="0"/>
-              </a:spcBef>
-              <a:spcAft>
-                <a:spcPts val="0"/>
-              </a:spcAft>
-              <a:buClr>
-                <a:srgbClr val="000000"/>
-              </a:buClr>
-              <a:buSzPts val="3200"/>
-              <a:buFont typeface="Arial"/>
-              <a:buChar char="•"/>
-            </a:pPr>
-            <a:r>
-              <a:rPr b="1" i="0" lang="en-US" sz="3200" u="none" cap="none" strike="noStrike">
-                <a:solidFill>
-                  <a:srgbClr val="000000"/>
-                </a:solidFill>
-                <a:latin typeface="Open Sans"/>
-                <a:ea typeface="Open Sans"/>
-                <a:cs typeface="Open Sans"/>
-                <a:sym typeface="Open Sans"/>
-              </a:rPr>
-              <a:t>problémák kezelése</a:t>
-            </a:r>
-            <a:endParaRPr b="0" i="0" sz="1400" u="none" cap="none" strike="noStrike">
-              <a:solidFill>
-                <a:srgbClr val="000000"/>
-              </a:solidFill>
-              <a:latin typeface="Arial"/>
-              <a:ea typeface="Arial"/>
-              <a:cs typeface="Arial"/>
-              <a:sym typeface="Arial"/>
-            </a:endParaRPr>
-          </a:p>
-          <a:p>
-            <a:pPr indent="-345445" lvl="1" marL="690890" marR="0" rtl="0" algn="l">
-              <a:lnSpc>
-                <a:spcPct val="140000"/>
-              </a:lnSpc>
-              <a:spcBef>
-                <a:spcPts val="0"/>
-              </a:spcBef>
-              <a:spcAft>
-                <a:spcPts val="0"/>
-              </a:spcAft>
-              <a:buClr>
-                <a:srgbClr val="000000"/>
-              </a:buClr>
-              <a:buSzPts val="3200"/>
-              <a:buFont typeface="Arial"/>
-              <a:buChar char="•"/>
-            </a:pPr>
-            <a:r>
-              <a:rPr b="1" i="0" lang="en-US" sz="3200" u="none" cap="none" strike="noStrike">
-                <a:solidFill>
-                  <a:srgbClr val="000000"/>
-                </a:solidFill>
-                <a:latin typeface="Open Sans"/>
-                <a:ea typeface="Open Sans"/>
-                <a:cs typeface="Open Sans"/>
-                <a:sym typeface="Open Sans"/>
-              </a:rPr>
-              <a:t>tagok felvétele</a:t>
-            </a:r>
-            <a:endParaRPr b="0" i="0" sz="1400" u="none" cap="none" strike="noStrike">
-              <a:solidFill>
-                <a:srgbClr val="000000"/>
-              </a:solidFill>
-              <a:latin typeface="Arial"/>
-              <a:ea typeface="Arial"/>
-              <a:cs typeface="Arial"/>
-              <a:sym typeface="Arial"/>
-            </a:endParaRPr>
-          </a:p>
-          <a:p>
-            <a:pPr indent="-345445" lvl="1" marL="690890" marR="0" rtl="0" algn="l">
-              <a:lnSpc>
-                <a:spcPct val="140000"/>
-              </a:lnSpc>
-              <a:spcBef>
-                <a:spcPts val="0"/>
-              </a:spcBef>
-              <a:spcAft>
-                <a:spcPts val="0"/>
-              </a:spcAft>
-              <a:buClr>
-                <a:srgbClr val="000000"/>
-              </a:buClr>
-              <a:buSzPts val="3200"/>
-              <a:buFont typeface="Arial"/>
-              <a:buChar char="•"/>
-            </a:pPr>
-            <a:r>
-              <a:rPr b="1" i="0" lang="en-US" sz="3200" u="none" cap="none" strike="noStrike">
-                <a:solidFill>
-                  <a:srgbClr val="000000"/>
-                </a:solidFill>
-                <a:latin typeface="Open Sans"/>
-                <a:ea typeface="Open Sans"/>
-                <a:cs typeface="Open Sans"/>
-                <a:sym typeface="Open Sans"/>
-              </a:rPr>
-              <a:t>projekt testreszabása </a:t>
-            </a:r>
-            <a:endParaRPr b="0" i="0" sz="1400" u="none" cap="none" strike="noStrike">
-              <a:solidFill>
-                <a:srgbClr val="000000"/>
-              </a:solidFill>
-              <a:latin typeface="Arial"/>
-              <a:ea typeface="Arial"/>
-              <a:cs typeface="Arial"/>
-              <a:sym typeface="Arial"/>
-            </a:endParaRPr>
-          </a:p>
-        </p:txBody>
-      </p:sp>
-      <p:sp>
-        <p:nvSpPr>
-          <p:cNvPr id="117" name="Google Shape;117;p15"/>
           <p:cNvSpPr/>
           <p:nvPr/>
         </p:nvSpPr>
         <p:spPr>
           <a:xfrm>
-            <a:off x="2338017" y="5225058"/>
-            <a:ext cx="609484" cy="609484"/>
+            <a:off x="7675657" y="3089944"/>
+            <a:ext cx="951577" cy="951577"/>
           </a:xfrm>
           <a:custGeom>
             <a:rect b="b" l="l" r="r" t="t"/>
             <a:pathLst>
-              <a:path extrusionOk="0" h="609484" w="609484">
+              <a:path extrusionOk="0" h="951577" w="951577">
                 <a:moveTo>
                   <a:pt x="0" y="0"/>
                 </a:moveTo>
                 <a:lnTo>
-                  <a:pt x="609485" y="0"/>
-                </a:lnTo>
-                <a:lnTo>
-                  <a:pt x="609485" y="609484"/>
-                </a:lnTo>
-                <a:lnTo>
-                  <a:pt x="0" y="609484"/>
+                  <a:pt x="951578" y="0"/>
+                </a:lnTo>
+                <a:lnTo>
+                  <a:pt x="951578" y="951577"/>
+                </a:lnTo>
+                <a:lnTo>
+                  <a:pt x="0" y="951577"/>
                 </a:lnTo>
                 <a:lnTo>
                   <a:pt x="0" y="0"/>
@@ -18718,13 +18108,545 @@
       </p:sp>
       <p:sp>
         <p:nvSpPr>
-          <p:cNvPr id="118" name="Google Shape;118;p15"/>
+          <p:cNvPr id="113" name="Google Shape;113;p15"/>
+          <p:cNvSpPr txBox="1"/>
+          <p:nvPr/>
+        </p:nvSpPr>
+        <p:spPr>
+          <a:xfrm>
+            <a:off x="3839573" y="4458223"/>
+            <a:ext cx="8623746" cy="1661794"/>
+          </a:xfrm>
+          <a:prstGeom prst="rect">
+            <a:avLst/>
+          </a:prstGeom>
+          <a:noFill/>
+          <a:ln>
+            <a:noFill/>
+          </a:ln>
+        </p:spPr>
+        <p:txBody>
+          <a:bodyPr anchorCtr="0" anchor="t" bIns="0" lIns="0" spcFirstLastPara="1" rIns="0" wrap="square" tIns="0">
+            <a:spAutoFit/>
+          </a:bodyPr>
+          <a:lstStyle/>
+          <a:p>
+            <a:pPr indent="-345445" lvl="1" marL="690890" marR="0" rtl="0" algn="l">
+              <a:lnSpc>
+                <a:spcPct val="140000"/>
+              </a:lnSpc>
+              <a:spcBef>
+                <a:spcPts val="0"/>
+              </a:spcBef>
+              <a:spcAft>
+                <a:spcPts val="0"/>
+              </a:spcAft>
+              <a:buClr>
+                <a:srgbClr val="000000"/>
+              </a:buClr>
+              <a:buSzPts val="3200"/>
+              <a:buFont typeface="Arial"/>
+              <a:buChar char="•"/>
+            </a:pPr>
+            <a:r>
+              <a:rPr b="1" i="0" lang="en-US" sz="3200" u="none" cap="none" strike="noStrike">
+                <a:solidFill>
+                  <a:srgbClr val="000000"/>
+                </a:solidFill>
+                <a:latin typeface="Open Sans"/>
+                <a:ea typeface="Open Sans"/>
+                <a:cs typeface="Open Sans"/>
+                <a:sym typeface="Open Sans"/>
+              </a:rPr>
+              <a:t>Tailwind CSS</a:t>
+            </a:r>
+            <a:endParaRPr b="0" i="0" sz="1400" u="none" cap="none" strike="noStrike">
+              <a:solidFill>
+                <a:srgbClr val="000000"/>
+              </a:solidFill>
+              <a:latin typeface="Arial"/>
+              <a:ea typeface="Arial"/>
+              <a:cs typeface="Arial"/>
+              <a:sym typeface="Arial"/>
+            </a:endParaRPr>
+          </a:p>
+          <a:p>
+            <a:pPr indent="-345445" lvl="1" marL="690890" marR="0" rtl="0" algn="l">
+              <a:lnSpc>
+                <a:spcPct val="140000"/>
+              </a:lnSpc>
+              <a:spcBef>
+                <a:spcPts val="0"/>
+              </a:spcBef>
+              <a:spcAft>
+                <a:spcPts val="0"/>
+              </a:spcAft>
+              <a:buClr>
+                <a:srgbClr val="000000"/>
+              </a:buClr>
+              <a:buSzPts val="3200"/>
+              <a:buFont typeface="Arial"/>
+              <a:buChar char="•"/>
+            </a:pPr>
+            <a:r>
+              <a:rPr b="1" i="0" lang="en-US" sz="3200" u="none" cap="none" strike="noStrike">
+                <a:solidFill>
+                  <a:srgbClr val="000000"/>
+                </a:solidFill>
+                <a:latin typeface="Open Sans"/>
+                <a:ea typeface="Open Sans"/>
+                <a:cs typeface="Open Sans"/>
+                <a:sym typeface="Open Sans"/>
+              </a:rPr>
+              <a:t>shadcn/ui</a:t>
+            </a:r>
+            <a:endParaRPr b="0" i="0" sz="1400" u="none" cap="none" strike="noStrike">
+              <a:solidFill>
+                <a:srgbClr val="000000"/>
+              </a:solidFill>
+              <a:latin typeface="Arial"/>
+              <a:ea typeface="Arial"/>
+              <a:cs typeface="Arial"/>
+              <a:sym typeface="Arial"/>
+            </a:endParaRPr>
+          </a:p>
+          <a:p>
+            <a:pPr indent="-345445" lvl="1" marL="690890" marR="0" rtl="0" algn="l">
+              <a:lnSpc>
+                <a:spcPct val="140000"/>
+              </a:lnSpc>
+              <a:spcBef>
+                <a:spcPts val="0"/>
+              </a:spcBef>
+              <a:spcAft>
+                <a:spcPts val="0"/>
+              </a:spcAft>
+              <a:buClr>
+                <a:srgbClr val="000000"/>
+              </a:buClr>
+              <a:buSzPts val="3200"/>
+              <a:buFont typeface="Arial"/>
+              <a:buChar char="•"/>
+            </a:pPr>
+            <a:r>
+              <a:rPr b="1" i="0" lang="en-US" sz="3200" u="none" cap="none" strike="noStrike">
+                <a:solidFill>
+                  <a:srgbClr val="000000"/>
+                </a:solidFill>
+                <a:latin typeface="Open Sans"/>
+                <a:ea typeface="Open Sans"/>
+                <a:cs typeface="Open Sans"/>
+                <a:sym typeface="Open Sans"/>
+              </a:rPr>
+              <a:t>Radix UI</a:t>
+            </a:r>
+            <a:endParaRPr b="0" i="0" sz="1400" u="none" cap="none" strike="noStrike">
+              <a:solidFill>
+                <a:srgbClr val="000000"/>
+              </a:solidFill>
+              <a:latin typeface="Arial"/>
+              <a:ea typeface="Arial"/>
+              <a:cs typeface="Arial"/>
+              <a:sym typeface="Arial"/>
+            </a:endParaRPr>
+          </a:p>
+        </p:txBody>
+      </p:sp>
+      <p:sp>
+        <p:nvSpPr>
+          <p:cNvPr id="114" name="Google Shape;114;p15"/>
           <p:cNvSpPr/>
           <p:nvPr/>
         </p:nvSpPr>
         <p:spPr>
           <a:xfrm>
-            <a:off x="11220599" y="8434204"/>
+            <a:off x="8966800" y="4843289"/>
+            <a:ext cx="949800" cy="949800"/>
+          </a:xfrm>
+          <a:custGeom>
+            <a:rect b="b" l="l" r="r" t="t"/>
+            <a:pathLst>
+              <a:path extrusionOk="0" h="949800" w="949800">
+                <a:moveTo>
+                  <a:pt x="0" y="0"/>
+                </a:moveTo>
+                <a:lnTo>
+                  <a:pt x="949800" y="0"/>
+                </a:lnTo>
+                <a:lnTo>
+                  <a:pt x="949800" y="949800"/>
+                </a:lnTo>
+                <a:lnTo>
+                  <a:pt x="0" y="949800"/>
+                </a:lnTo>
+                <a:lnTo>
+                  <a:pt x="0" y="0"/>
+                </a:lnTo>
+                <a:close/>
+              </a:path>
+            </a:pathLst>
+          </a:custGeom>
+          <a:blipFill rotWithShape="1">
+            <a:blip r:embed="rId5">
+              <a:alphaModFix/>
+            </a:blip>
+            <a:stretch>
+              <a:fillRect b="0" l="0" r="0" t="0"/>
+            </a:stretch>
+          </a:blipFill>
+          <a:ln>
+            <a:noFill/>
+          </a:ln>
+        </p:spPr>
+      </p:sp>
+      <p:sp>
+        <p:nvSpPr>
+          <p:cNvPr id="115" name="Google Shape;115;p15"/>
+          <p:cNvSpPr/>
+          <p:nvPr/>
+        </p:nvSpPr>
+        <p:spPr>
+          <a:xfrm>
+            <a:off x="7675657" y="4842301"/>
+            <a:ext cx="950788" cy="950788"/>
+          </a:xfrm>
+          <a:custGeom>
+            <a:rect b="b" l="l" r="r" t="t"/>
+            <a:pathLst>
+              <a:path extrusionOk="0" h="950788" w="950788">
+                <a:moveTo>
+                  <a:pt x="0" y="0"/>
+                </a:moveTo>
+                <a:lnTo>
+                  <a:pt x="950788" y="0"/>
+                </a:lnTo>
+                <a:lnTo>
+                  <a:pt x="950788" y="950788"/>
+                </a:lnTo>
+                <a:lnTo>
+                  <a:pt x="0" y="950788"/>
+                </a:lnTo>
+                <a:lnTo>
+                  <a:pt x="0" y="0"/>
+                </a:lnTo>
+                <a:close/>
+              </a:path>
+            </a:pathLst>
+          </a:custGeom>
+          <a:blipFill rotWithShape="1">
+            <a:blip r:embed="rId6">
+              <a:alphaModFix/>
+            </a:blip>
+            <a:stretch>
+              <a:fillRect b="0" l="0" r="0" t="0"/>
+            </a:stretch>
+          </a:blipFill>
+          <a:ln>
+            <a:noFill/>
+          </a:ln>
+        </p:spPr>
+      </p:sp>
+      <p:sp>
+        <p:nvSpPr>
+          <p:cNvPr id="116" name="Google Shape;116;p15"/>
+          <p:cNvSpPr/>
+          <p:nvPr/>
+        </p:nvSpPr>
+        <p:spPr>
+          <a:xfrm>
+            <a:off x="10259500" y="4843289"/>
+            <a:ext cx="951776" cy="951776"/>
+          </a:xfrm>
+          <a:custGeom>
+            <a:rect b="b" l="l" r="r" t="t"/>
+            <a:pathLst>
+              <a:path extrusionOk="0" h="951776" w="951776">
+                <a:moveTo>
+                  <a:pt x="0" y="0"/>
+                </a:moveTo>
+                <a:lnTo>
+                  <a:pt x="951777" y="0"/>
+                </a:lnTo>
+                <a:lnTo>
+                  <a:pt x="951777" y="951777"/>
+                </a:lnTo>
+                <a:lnTo>
+                  <a:pt x="0" y="951777"/>
+                </a:lnTo>
+                <a:lnTo>
+                  <a:pt x="0" y="0"/>
+                </a:lnTo>
+                <a:close/>
+              </a:path>
+            </a:pathLst>
+          </a:custGeom>
+          <a:blipFill rotWithShape="1">
+            <a:blip r:embed="rId7">
+              <a:alphaModFix/>
+            </a:blip>
+            <a:stretch>
+              <a:fillRect b="0" l="0" r="0" t="0"/>
+            </a:stretch>
+          </a:blipFill>
+          <a:ln>
+            <a:noFill/>
+          </a:ln>
+        </p:spPr>
+      </p:sp>
+      <p:sp>
+        <p:nvSpPr>
+          <p:cNvPr id="117" name="Google Shape;117;p15"/>
+          <p:cNvSpPr/>
+          <p:nvPr/>
+        </p:nvSpPr>
+        <p:spPr>
+          <a:xfrm>
+            <a:off x="7199466" y="6592742"/>
+            <a:ext cx="952382" cy="953831"/>
+          </a:xfrm>
+          <a:custGeom>
+            <a:rect b="b" l="l" r="r" t="t"/>
+            <a:pathLst>
+              <a:path extrusionOk="0" h="953831" w="952382">
+                <a:moveTo>
+                  <a:pt x="0" y="0"/>
+                </a:moveTo>
+                <a:lnTo>
+                  <a:pt x="952382" y="0"/>
+                </a:lnTo>
+                <a:lnTo>
+                  <a:pt x="952382" y="953831"/>
+                </a:lnTo>
+                <a:lnTo>
+                  <a:pt x="0" y="953831"/>
+                </a:lnTo>
+                <a:lnTo>
+                  <a:pt x="0" y="0"/>
+                </a:lnTo>
+                <a:close/>
+              </a:path>
+            </a:pathLst>
+          </a:custGeom>
+          <a:blipFill rotWithShape="1">
+            <a:blip r:embed="rId8">
+              <a:alphaModFix/>
+            </a:blip>
+            <a:stretch>
+              <a:fillRect b="0" l="0" r="0" t="-2932"/>
+            </a:stretch>
+          </a:blipFill>
+          <a:ln>
+            <a:noFill/>
+          </a:ln>
+        </p:spPr>
+      </p:sp>
+      <p:sp>
+        <p:nvSpPr>
+          <p:cNvPr id="118" name="Google Shape;118;p15"/>
+          <p:cNvSpPr txBox="1"/>
+          <p:nvPr/>
+        </p:nvSpPr>
+        <p:spPr>
+          <a:xfrm>
+            <a:off x="3062802" y="2673083"/>
+            <a:ext cx="13707597" cy="537844"/>
+          </a:xfrm>
+          <a:prstGeom prst="rect">
+            <a:avLst/>
+          </a:prstGeom>
+          <a:noFill/>
+          <a:ln>
+            <a:noFill/>
+          </a:ln>
+        </p:spPr>
+        <p:txBody>
+          <a:bodyPr anchorCtr="0" anchor="t" bIns="0" lIns="0" spcFirstLastPara="1" rIns="0" wrap="square" tIns="0">
+            <a:spAutoFit/>
+          </a:bodyPr>
+          <a:lstStyle/>
+          <a:p>
+            <a:pPr indent="0" lvl="0" marL="0" marR="0" rtl="0" algn="l">
+              <a:lnSpc>
+                <a:spcPct val="140000"/>
+              </a:lnSpc>
+              <a:spcBef>
+                <a:spcPts val="0"/>
+              </a:spcBef>
+              <a:spcAft>
+                <a:spcPts val="0"/>
+              </a:spcAft>
+              <a:buClr>
+                <a:srgbClr val="000000"/>
+              </a:buClr>
+              <a:buSzPts val="3200"/>
+              <a:buFont typeface="Arial"/>
+              <a:buNone/>
+            </a:pPr>
+            <a:r>
+              <a:rPr b="0" i="0" lang="en-US" sz="3200" u="none" cap="none" strike="noStrike">
+                <a:solidFill>
+                  <a:srgbClr val="000000"/>
+                </a:solidFill>
+                <a:latin typeface="Open Sans"/>
+                <a:ea typeface="Open Sans"/>
+                <a:cs typeface="Open Sans"/>
+                <a:sym typeface="Open Sans"/>
+              </a:rPr>
+              <a:t>Fullstack</a:t>
+            </a:r>
+            <a:endParaRPr b="0" i="0" sz="1400" u="none" cap="none" strike="noStrike">
+              <a:solidFill>
+                <a:srgbClr val="000000"/>
+              </a:solidFill>
+              <a:latin typeface="Arial"/>
+              <a:ea typeface="Arial"/>
+              <a:cs typeface="Arial"/>
+              <a:sym typeface="Arial"/>
+            </a:endParaRPr>
+          </a:p>
+        </p:txBody>
+      </p:sp>
+      <p:sp>
+        <p:nvSpPr>
+          <p:cNvPr id="119" name="Google Shape;119;p15"/>
+          <p:cNvSpPr txBox="1"/>
+          <p:nvPr/>
+        </p:nvSpPr>
+        <p:spPr>
+          <a:xfrm>
+            <a:off x="3062802" y="6237292"/>
+            <a:ext cx="13707600" cy="492600"/>
+          </a:xfrm>
+          <a:prstGeom prst="rect">
+            <a:avLst/>
+          </a:prstGeom>
+          <a:noFill/>
+          <a:ln>
+            <a:noFill/>
+          </a:ln>
+        </p:spPr>
+        <p:txBody>
+          <a:bodyPr anchorCtr="0" anchor="t" bIns="0" lIns="0" spcFirstLastPara="1" rIns="0" wrap="square" tIns="0">
+            <a:spAutoFit/>
+          </a:bodyPr>
+          <a:lstStyle/>
+          <a:p>
+            <a:pPr indent="0" lvl="0" marL="0" marR="0" rtl="0" algn="l">
+              <a:lnSpc>
+                <a:spcPct val="140000"/>
+              </a:lnSpc>
+              <a:spcBef>
+                <a:spcPts val="0"/>
+              </a:spcBef>
+              <a:spcAft>
+                <a:spcPts val="0"/>
+              </a:spcAft>
+              <a:buClr>
+                <a:srgbClr val="000000"/>
+              </a:buClr>
+              <a:buSzPts val="3200"/>
+              <a:buFont typeface="Arial"/>
+              <a:buNone/>
+            </a:pPr>
+            <a:r>
+              <a:rPr b="0" i="0" lang="en-US" sz="3200" u="none" cap="none" strike="noStrike">
+                <a:solidFill>
+                  <a:srgbClr val="000000"/>
+                </a:solidFill>
+                <a:latin typeface="Open Sans"/>
+                <a:ea typeface="Open Sans"/>
+                <a:cs typeface="Open Sans"/>
+                <a:sym typeface="Open Sans"/>
+              </a:rPr>
+              <a:t>Adatbázis</a:t>
+            </a:r>
+            <a:endParaRPr b="0" i="0" sz="1400" u="none" cap="none" strike="noStrike">
+              <a:solidFill>
+                <a:srgbClr val="000000"/>
+              </a:solidFill>
+              <a:latin typeface="Arial"/>
+              <a:ea typeface="Arial"/>
+              <a:cs typeface="Arial"/>
+              <a:sym typeface="Arial"/>
+            </a:endParaRPr>
+          </a:p>
+        </p:txBody>
+      </p:sp>
+      <p:sp>
+        <p:nvSpPr>
+          <p:cNvPr id="120" name="Google Shape;120;p15"/>
+          <p:cNvSpPr txBox="1"/>
+          <p:nvPr/>
+        </p:nvSpPr>
+        <p:spPr>
+          <a:xfrm>
+            <a:off x="3839573" y="6772161"/>
+            <a:ext cx="8623746" cy="537844"/>
+          </a:xfrm>
+          <a:prstGeom prst="rect">
+            <a:avLst/>
+          </a:prstGeom>
+          <a:noFill/>
+          <a:ln>
+            <a:noFill/>
+          </a:ln>
+        </p:spPr>
+        <p:txBody>
+          <a:bodyPr anchorCtr="0" anchor="t" bIns="0" lIns="0" spcFirstLastPara="1" rIns="0" wrap="square" tIns="0">
+            <a:spAutoFit/>
+          </a:bodyPr>
+          <a:lstStyle/>
+          <a:p>
+            <a:pPr indent="-345445" lvl="1" marL="690890" marR="0" rtl="0" algn="l">
+              <a:lnSpc>
+                <a:spcPct val="140000"/>
+              </a:lnSpc>
+              <a:spcBef>
+                <a:spcPts val="0"/>
+              </a:spcBef>
+              <a:spcAft>
+                <a:spcPts val="0"/>
+              </a:spcAft>
+              <a:buClr>
+                <a:srgbClr val="000000"/>
+              </a:buClr>
+              <a:buSzPts val="3200"/>
+              <a:buFont typeface="Arial"/>
+              <a:buChar char="•"/>
+            </a:pPr>
+            <a:r>
+              <a:rPr b="1" i="0" lang="en-US" sz="3200" u="none" cap="none" strike="noStrike">
+                <a:solidFill>
+                  <a:srgbClr val="000000"/>
+                </a:solidFill>
+                <a:latin typeface="Open Sans"/>
+                <a:ea typeface="Open Sans"/>
+                <a:cs typeface="Open Sans"/>
+                <a:sym typeface="Open Sans"/>
+              </a:rPr>
+              <a:t>PostgreSQL</a:t>
+            </a:r>
+            <a:endParaRPr b="0" i="0" sz="1400" u="none" cap="none" strike="noStrike">
+              <a:solidFill>
+                <a:srgbClr val="000000"/>
+              </a:solidFill>
+              <a:latin typeface="Arial"/>
+              <a:ea typeface="Arial"/>
+              <a:cs typeface="Arial"/>
+              <a:sym typeface="Arial"/>
+            </a:endParaRPr>
+          </a:p>
+        </p:txBody>
+      </p:sp>
+      <p:sp>
+        <p:nvSpPr>
+          <p:cNvPr id="121" name="Google Shape;121;p15"/>
+          <p:cNvSpPr/>
+          <p:nvPr/>
+        </p:nvSpPr>
+        <p:spPr>
+          <a:xfrm>
+            <a:off x="1601313" y="5317695"/>
             <a:ext cx="609484" cy="609484"/>
           </a:xfrm>
           <a:custGeom>
@@ -18735,13 +18657,728 @@
                   <a:pt x="0" y="0"/>
                 </a:moveTo>
                 <a:lnTo>
+                  <a:pt x="609485" y="0"/>
+                </a:lnTo>
+                <a:lnTo>
+                  <a:pt x="609485" y="609485"/>
+                </a:lnTo>
+                <a:lnTo>
+                  <a:pt x="0" y="609485"/>
+                </a:lnTo>
+                <a:lnTo>
+                  <a:pt x="0" y="0"/>
+                </a:lnTo>
+                <a:close/>
+              </a:path>
+            </a:pathLst>
+          </a:custGeom>
+          <a:blipFill rotWithShape="1">
+            <a:blip r:embed="rId9">
+              <a:alphaModFix/>
+            </a:blip>
+            <a:stretch>
+              <a:fillRect b="0" l="0" r="0" t="0"/>
+            </a:stretch>
+          </a:blipFill>
+          <a:ln>
+            <a:noFill/>
+          </a:ln>
+        </p:spPr>
+      </p:sp>
+      <p:sp>
+        <p:nvSpPr>
+          <p:cNvPr id="122" name="Google Shape;122;p15"/>
+          <p:cNvSpPr/>
+          <p:nvPr/>
+        </p:nvSpPr>
+        <p:spPr>
+          <a:xfrm>
+            <a:off x="9144000" y="8262505"/>
+            <a:ext cx="609484" cy="609484"/>
+          </a:xfrm>
+          <a:custGeom>
+            <a:rect b="b" l="l" r="r" t="t"/>
+            <a:pathLst>
+              <a:path extrusionOk="0" h="609484" w="609484">
+                <a:moveTo>
+                  <a:pt x="0" y="0"/>
+                </a:moveTo>
+                <a:lnTo>
                   <a:pt x="609484" y="0"/>
                 </a:lnTo>
                 <a:lnTo>
+                  <a:pt x="609484" y="609484"/>
+                </a:lnTo>
+                <a:lnTo>
+                  <a:pt x="0" y="609484"/>
+                </a:lnTo>
+                <a:lnTo>
+                  <a:pt x="0" y="0"/>
+                </a:lnTo>
+                <a:close/>
+              </a:path>
+            </a:pathLst>
+          </a:custGeom>
+          <a:blipFill rotWithShape="1">
+            <a:blip r:embed="rId9">
+              <a:alphaModFix/>
+            </a:blip>
+            <a:stretch>
+              <a:fillRect b="0" l="0" r="0" t="0"/>
+            </a:stretch>
+          </a:blipFill>
+          <a:ln>
+            <a:noFill/>
+          </a:ln>
+        </p:spPr>
+      </p:sp>
+      <p:sp>
+        <p:nvSpPr>
+          <p:cNvPr id="123" name="Google Shape;123;p15"/>
+          <p:cNvSpPr/>
+          <p:nvPr/>
+        </p:nvSpPr>
+        <p:spPr>
+          <a:xfrm>
+            <a:off x="11853835" y="2006448"/>
+            <a:ext cx="609484" cy="609484"/>
+          </a:xfrm>
+          <a:custGeom>
+            <a:rect b="b" l="l" r="r" t="t"/>
+            <a:pathLst>
+              <a:path extrusionOk="0" h="609484" w="609484">
+                <a:moveTo>
+                  <a:pt x="0" y="0"/>
+                </a:moveTo>
+                <a:lnTo>
+                  <a:pt x="609484" y="0"/>
+                </a:lnTo>
+                <a:lnTo>
                   <a:pt x="609484" y="609485"/>
                 </a:lnTo>
                 <a:lnTo>
                   <a:pt x="0" y="609485"/>
+                </a:lnTo>
+                <a:lnTo>
+                  <a:pt x="0" y="0"/>
+                </a:lnTo>
+                <a:close/>
+              </a:path>
+            </a:pathLst>
+          </a:custGeom>
+          <a:blipFill rotWithShape="1">
+            <a:blip r:embed="rId9">
+              <a:alphaModFix/>
+            </a:blip>
+            <a:stretch>
+              <a:fillRect b="0" l="0" r="0" t="0"/>
+            </a:stretch>
+          </a:blipFill>
+          <a:ln>
+            <a:noFill/>
+          </a:ln>
+        </p:spPr>
+      </p:sp>
+      <p:sp>
+        <p:nvSpPr>
+          <p:cNvPr id="124" name="Google Shape;124;p15"/>
+          <p:cNvSpPr txBox="1"/>
+          <p:nvPr/>
+        </p:nvSpPr>
+        <p:spPr>
+          <a:xfrm>
+            <a:off x="5725500" y="383950"/>
+            <a:ext cx="6837000" cy="1108200"/>
+          </a:xfrm>
+          <a:prstGeom prst="rect">
+            <a:avLst/>
+          </a:prstGeom>
+          <a:noFill/>
+          <a:ln>
+            <a:noFill/>
+          </a:ln>
+        </p:spPr>
+        <p:txBody>
+          <a:bodyPr anchorCtr="0" anchor="t" bIns="0" lIns="0" spcFirstLastPara="1" rIns="0" wrap="square" tIns="0">
+            <a:spAutoFit/>
+          </a:bodyPr>
+          <a:lstStyle/>
+          <a:p>
+            <a:pPr indent="0" lvl="0" marL="0" marR="0" rtl="0" algn="ctr">
+              <a:lnSpc>
+                <a:spcPct val="140000"/>
+              </a:lnSpc>
+              <a:spcBef>
+                <a:spcPts val="0"/>
+              </a:spcBef>
+              <a:spcAft>
+                <a:spcPts val="0"/>
+              </a:spcAft>
+              <a:buClr>
+                <a:srgbClr val="000000"/>
+              </a:buClr>
+              <a:buSzPts val="7200"/>
+              <a:buFont typeface="Arial"/>
+              <a:buNone/>
+            </a:pPr>
+            <a:r>
+              <a:rPr b="1" i="0" lang="en-US" sz="7200" u="none" cap="none" strike="noStrike">
+                <a:solidFill>
+                  <a:srgbClr val="44CA84"/>
+                </a:solidFill>
+                <a:latin typeface="Open Sans"/>
+                <a:ea typeface="Open Sans"/>
+                <a:cs typeface="Open Sans"/>
+                <a:sym typeface="Open Sans"/>
+              </a:rPr>
+              <a:t>Tech stack</a:t>
+            </a:r>
+            <a:endParaRPr b="0" i="0" sz="1400" u="none" cap="none" strike="noStrike">
+              <a:solidFill>
+                <a:srgbClr val="000000"/>
+              </a:solidFill>
+              <a:latin typeface="Arial"/>
+              <a:ea typeface="Arial"/>
+              <a:cs typeface="Arial"/>
+              <a:sym typeface="Arial"/>
+            </a:endParaRPr>
+          </a:p>
+        </p:txBody>
+      </p:sp>
+      <p:sp>
+        <p:nvSpPr>
+          <p:cNvPr id="125" name="Google Shape;125;p15"/>
+          <p:cNvSpPr txBox="1"/>
+          <p:nvPr/>
+        </p:nvSpPr>
+        <p:spPr>
+          <a:xfrm>
+            <a:off x="3839573" y="3268236"/>
+            <a:ext cx="8623746" cy="537844"/>
+          </a:xfrm>
+          <a:prstGeom prst="rect">
+            <a:avLst/>
+          </a:prstGeom>
+          <a:noFill/>
+          <a:ln>
+            <a:noFill/>
+          </a:ln>
+        </p:spPr>
+        <p:txBody>
+          <a:bodyPr anchorCtr="0" anchor="t" bIns="0" lIns="0" spcFirstLastPara="1" rIns="0" wrap="square" tIns="0">
+            <a:spAutoFit/>
+          </a:bodyPr>
+          <a:lstStyle/>
+          <a:p>
+            <a:pPr indent="-345445" lvl="1" marL="690890" marR="0" rtl="0" algn="l">
+              <a:lnSpc>
+                <a:spcPct val="140000"/>
+              </a:lnSpc>
+              <a:spcBef>
+                <a:spcPts val="0"/>
+              </a:spcBef>
+              <a:spcAft>
+                <a:spcPts val="0"/>
+              </a:spcAft>
+              <a:buClr>
+                <a:srgbClr val="000000"/>
+              </a:buClr>
+              <a:buSzPts val="3200"/>
+              <a:buFont typeface="Arial"/>
+              <a:buChar char="•"/>
+            </a:pPr>
+            <a:r>
+              <a:rPr b="1" i="0" lang="en-US" sz="3200" u="none" cap="none" strike="noStrike">
+                <a:solidFill>
+                  <a:srgbClr val="000000"/>
+                </a:solidFill>
+                <a:latin typeface="Open Sans"/>
+                <a:ea typeface="Open Sans"/>
+                <a:cs typeface="Open Sans"/>
+                <a:sym typeface="Open Sans"/>
+              </a:rPr>
+              <a:t>Next.js 15.2.3</a:t>
+            </a:r>
+            <a:endParaRPr b="0" i="0" sz="1400" u="none" cap="none" strike="noStrike">
+              <a:solidFill>
+                <a:srgbClr val="000000"/>
+              </a:solidFill>
+              <a:latin typeface="Arial"/>
+              <a:ea typeface="Arial"/>
+              <a:cs typeface="Arial"/>
+              <a:sym typeface="Arial"/>
+            </a:endParaRPr>
+          </a:p>
+        </p:txBody>
+      </p:sp>
+      <p:sp>
+        <p:nvSpPr>
+          <p:cNvPr id="126" name="Google Shape;126;p15"/>
+          <p:cNvSpPr txBox="1"/>
+          <p:nvPr/>
+        </p:nvSpPr>
+        <p:spPr>
+          <a:xfrm>
+            <a:off x="3062802" y="3863229"/>
+            <a:ext cx="13707597" cy="537844"/>
+          </a:xfrm>
+          <a:prstGeom prst="rect">
+            <a:avLst/>
+          </a:prstGeom>
+          <a:noFill/>
+          <a:ln>
+            <a:noFill/>
+          </a:ln>
+        </p:spPr>
+        <p:txBody>
+          <a:bodyPr anchorCtr="0" anchor="t" bIns="0" lIns="0" spcFirstLastPara="1" rIns="0" wrap="square" tIns="0">
+            <a:spAutoFit/>
+          </a:bodyPr>
+          <a:lstStyle/>
+          <a:p>
+            <a:pPr indent="0" lvl="0" marL="0" marR="0" rtl="0" algn="l">
+              <a:lnSpc>
+                <a:spcPct val="140000"/>
+              </a:lnSpc>
+              <a:spcBef>
+                <a:spcPts val="0"/>
+              </a:spcBef>
+              <a:spcAft>
+                <a:spcPts val="0"/>
+              </a:spcAft>
+              <a:buClr>
+                <a:srgbClr val="000000"/>
+              </a:buClr>
+              <a:buSzPts val="3200"/>
+              <a:buFont typeface="Arial"/>
+              <a:buNone/>
+            </a:pPr>
+            <a:r>
+              <a:rPr b="0" i="0" lang="en-US" sz="3200" u="none" cap="none" strike="noStrike">
+                <a:solidFill>
+                  <a:srgbClr val="000000"/>
+                </a:solidFill>
+                <a:latin typeface="Open Sans"/>
+                <a:ea typeface="Open Sans"/>
+                <a:cs typeface="Open Sans"/>
+                <a:sym typeface="Open Sans"/>
+              </a:rPr>
+              <a:t>UI könyvtárak</a:t>
+            </a:r>
+            <a:endParaRPr b="0" i="0" sz="1400" u="none" cap="none" strike="noStrike">
+              <a:solidFill>
+                <a:srgbClr val="000000"/>
+              </a:solidFill>
+              <a:latin typeface="Arial"/>
+              <a:ea typeface="Arial"/>
+              <a:cs typeface="Arial"/>
+              <a:sym typeface="Arial"/>
+            </a:endParaRPr>
+          </a:p>
+        </p:txBody>
+      </p:sp>
+    </p:spTree>
+  </p:cSld>
+  <p:clrMapOvr>
+    <a:masterClrMapping/>
+  </p:clrMapOvr>
+</p:sld>
+</file>
+
+<file path=ppt/slides/slide4.xml><?xml version="1.0" encoding="utf-8"?>
+<p:sld xmlns:a="http://schemas.openxmlformats.org/drawingml/2006/main" xmlns:r="http://schemas.openxmlformats.org/officeDocument/2006/relationships" xmlns:mc="http://schemas.openxmlformats.org/markup-compatibility/2006" xmlns:mv="urn:schemas-microsoft-com:mac:vml" xmlns:p="http://schemas.openxmlformats.org/presentationml/2006/main" xmlns:c="http://schemas.openxmlformats.org/drawingml/2006/chart" xmlns:dgm="http://schemas.openxmlformats.org/drawingml/2006/diagram" xmlns:o="urn:schemas-microsoft-com:office:office" xmlns:v="urn:schemas-microsoft-com:vml" xmlns:pvml="urn:schemas-microsoft-com:office:powerpoint" xmlns:com="http://schemas.openxmlformats.org/drawingml/2006/compatibility" xmlns:p14="http://schemas.microsoft.com/office/powerpoint/2010/main" xmlns:p15="http://schemas.microsoft.com/office/powerpoint/2012/main" xmlns:ahyp="http://schemas.microsoft.com/office/drawing/2018/hyperlinkcolor">
+  <p:cSld>
+    <p:spTree>
+      <p:nvGrpSpPr>
+        <p:cNvPr id="130" name="Shape 130"/>
+        <p:cNvGrpSpPr/>
+        <p:nvPr/>
+      </p:nvGrpSpPr>
+      <p:grpSpPr>
+        <a:xfrm>
+          <a:off x="0" y="0"/>
+          <a:ext cx="0" cy="0"/>
+          <a:chOff x="0" y="0"/>
+          <a:chExt cx="0" cy="0"/>
+        </a:xfrm>
+      </p:grpSpPr>
+      <p:sp>
+        <p:nvSpPr>
+          <p:cNvPr id="131" name="Google Shape;131;p16"/>
+          <p:cNvSpPr/>
+          <p:nvPr/>
+        </p:nvSpPr>
+        <p:spPr>
+          <a:xfrm>
+            <a:off x="415650" y="407749"/>
+            <a:ext cx="1226101" cy="1241901"/>
+          </a:xfrm>
+          <a:custGeom>
+            <a:rect b="b" l="l" r="r" t="t"/>
+            <a:pathLst>
+              <a:path extrusionOk="0" h="1241901" w="1226101">
+                <a:moveTo>
+                  <a:pt x="0" y="0"/>
+                </a:moveTo>
+                <a:lnTo>
+                  <a:pt x="1226100" y="0"/>
+                </a:lnTo>
+                <a:lnTo>
+                  <a:pt x="1226100" y="1241902"/>
+                </a:lnTo>
+                <a:lnTo>
+                  <a:pt x="0" y="1241902"/>
+                </a:lnTo>
+                <a:lnTo>
+                  <a:pt x="0" y="0"/>
+                </a:lnTo>
+                <a:close/>
+              </a:path>
+            </a:pathLst>
+          </a:custGeom>
+          <a:blipFill rotWithShape="1">
+            <a:blip r:embed="rId3">
+              <a:alphaModFix/>
+            </a:blip>
+            <a:stretch>
+              <a:fillRect b="0" l="0" r="0" t="0"/>
+            </a:stretch>
+          </a:blipFill>
+          <a:ln>
+            <a:noFill/>
+          </a:ln>
+        </p:spPr>
+      </p:sp>
+      <p:cxnSp>
+        <p:nvCxnSpPr>
+          <p:cNvPr id="132" name="Google Shape;132;p16"/>
+          <p:cNvCxnSpPr/>
+          <p:nvPr/>
+        </p:nvCxnSpPr>
+        <p:spPr>
+          <a:xfrm>
+            <a:off x="-163821" y="10267950"/>
+            <a:ext cx="18451821" cy="19050"/>
+          </a:xfrm>
+          <a:prstGeom prst="straightConnector1">
+            <a:avLst/>
+          </a:prstGeom>
+          <a:noFill/>
+          <a:ln cap="flat" cmpd="sng" w="190500">
+            <a:solidFill>
+              <a:srgbClr val="44CA84"/>
+            </a:solidFill>
+            <a:prstDash val="solid"/>
+            <a:round/>
+            <a:headEnd len="sm" w="sm" type="none"/>
+            <a:tailEnd len="sm" w="sm" type="none"/>
+          </a:ln>
+        </p:spPr>
+      </p:cxnSp>
+      <p:sp>
+        <p:nvSpPr>
+          <p:cNvPr id="133" name="Google Shape;133;p16"/>
+          <p:cNvSpPr txBox="1"/>
+          <p:nvPr/>
+        </p:nvSpPr>
+        <p:spPr>
+          <a:xfrm>
+            <a:off x="5856982" y="348621"/>
+            <a:ext cx="6574036" cy="1226808"/>
+          </a:xfrm>
+          <a:prstGeom prst="rect">
+            <a:avLst/>
+          </a:prstGeom>
+          <a:noFill/>
+          <a:ln>
+            <a:noFill/>
+          </a:ln>
+        </p:spPr>
+        <p:txBody>
+          <a:bodyPr anchorCtr="0" anchor="t" bIns="0" lIns="0" spcFirstLastPara="1" rIns="0" wrap="square" tIns="0">
+            <a:spAutoFit/>
+          </a:bodyPr>
+          <a:lstStyle/>
+          <a:p>
+            <a:pPr indent="0" lvl="0" marL="0" marR="0" rtl="0" algn="ctr">
+              <a:lnSpc>
+                <a:spcPct val="140000"/>
+              </a:lnSpc>
+              <a:spcBef>
+                <a:spcPts val="0"/>
+              </a:spcBef>
+              <a:spcAft>
+                <a:spcPts val="0"/>
+              </a:spcAft>
+              <a:buClr>
+                <a:srgbClr val="000000"/>
+              </a:buClr>
+              <a:buSzPts val="7200"/>
+              <a:buFont typeface="Arial"/>
+              <a:buNone/>
+            </a:pPr>
+            <a:r>
+              <a:rPr b="1" i="0" lang="en-US" sz="7200" u="none" cap="none" strike="noStrike">
+                <a:solidFill>
+                  <a:srgbClr val="44CA84"/>
+                </a:solidFill>
+                <a:latin typeface="Open Sans"/>
+                <a:ea typeface="Open Sans"/>
+                <a:cs typeface="Open Sans"/>
+                <a:sym typeface="Open Sans"/>
+              </a:rPr>
+              <a:t> Csapatmunka</a:t>
+            </a:r>
+            <a:endParaRPr b="0" i="0" sz="1400" u="none" cap="none" strike="noStrike">
+              <a:solidFill>
+                <a:srgbClr val="000000"/>
+              </a:solidFill>
+              <a:latin typeface="Arial"/>
+              <a:ea typeface="Arial"/>
+              <a:cs typeface="Arial"/>
+              <a:sym typeface="Arial"/>
+            </a:endParaRPr>
+          </a:p>
+        </p:txBody>
+      </p:sp>
+      <p:sp>
+        <p:nvSpPr>
+          <p:cNvPr id="134" name="Google Shape;134;p16"/>
+          <p:cNvSpPr txBox="1"/>
+          <p:nvPr/>
+        </p:nvSpPr>
+        <p:spPr>
+          <a:xfrm>
+            <a:off x="3835402" y="4289189"/>
+            <a:ext cx="13707600" cy="1871700"/>
+          </a:xfrm>
+          <a:prstGeom prst="rect">
+            <a:avLst/>
+          </a:prstGeom>
+          <a:noFill/>
+          <a:ln>
+            <a:noFill/>
+          </a:ln>
+        </p:spPr>
+        <p:txBody>
+          <a:bodyPr anchorCtr="0" anchor="t" bIns="0" lIns="0" spcFirstLastPara="1" rIns="0" wrap="square" tIns="0">
+            <a:spAutoFit/>
+          </a:bodyPr>
+          <a:lstStyle/>
+          <a:p>
+            <a:pPr indent="-345445" lvl="1" marL="690890" marR="0" rtl="0" algn="l">
+              <a:lnSpc>
+                <a:spcPct val="140000"/>
+              </a:lnSpc>
+              <a:spcBef>
+                <a:spcPts val="0"/>
+              </a:spcBef>
+              <a:spcAft>
+                <a:spcPts val="0"/>
+              </a:spcAft>
+              <a:buClr>
+                <a:srgbClr val="000000"/>
+              </a:buClr>
+              <a:buSzPts val="3200"/>
+              <a:buFont typeface="Arial"/>
+              <a:buChar char="•"/>
+            </a:pPr>
+            <a:r>
+              <a:rPr b="1" i="0" lang="en-US" sz="3200" u="none" cap="none" strike="noStrike">
+                <a:solidFill>
+                  <a:srgbClr val="000000"/>
+                </a:solidFill>
+                <a:latin typeface="Open Sans"/>
+                <a:ea typeface="Open Sans"/>
+                <a:cs typeface="Open Sans"/>
+                <a:sym typeface="Open Sans"/>
+              </a:rPr>
+              <a:t>Discord</a:t>
+            </a:r>
+            <a:endParaRPr b="0" i="0" sz="1400" u="none" cap="none" strike="noStrike">
+              <a:solidFill>
+                <a:srgbClr val="000000"/>
+              </a:solidFill>
+              <a:latin typeface="Arial"/>
+              <a:ea typeface="Arial"/>
+              <a:cs typeface="Arial"/>
+              <a:sym typeface="Arial"/>
+            </a:endParaRPr>
+          </a:p>
+          <a:p>
+            <a:pPr indent="-345445" lvl="1" marL="690890" marR="0" rtl="0" algn="l">
+              <a:lnSpc>
+                <a:spcPct val="140000"/>
+              </a:lnSpc>
+              <a:spcBef>
+                <a:spcPts val="0"/>
+              </a:spcBef>
+              <a:spcAft>
+                <a:spcPts val="0"/>
+              </a:spcAft>
+              <a:buClr>
+                <a:srgbClr val="000000"/>
+              </a:buClr>
+              <a:buSzPts val="3200"/>
+              <a:buFont typeface="Arial"/>
+              <a:buChar char="•"/>
+            </a:pPr>
+            <a:r>
+              <a:rPr b="1" i="0" lang="en-US" sz="3200" u="none" cap="none" strike="noStrike">
+                <a:solidFill>
+                  <a:srgbClr val="000000"/>
+                </a:solidFill>
+                <a:latin typeface="Open Sans"/>
+                <a:ea typeface="Open Sans"/>
+                <a:cs typeface="Open Sans"/>
+                <a:sym typeface="Open Sans"/>
+              </a:rPr>
+              <a:t>Slack</a:t>
+            </a:r>
+            <a:endParaRPr b="0" i="0" sz="1400" u="none" cap="none" strike="noStrike">
+              <a:solidFill>
+                <a:srgbClr val="000000"/>
+              </a:solidFill>
+              <a:latin typeface="Arial"/>
+              <a:ea typeface="Arial"/>
+              <a:cs typeface="Arial"/>
+              <a:sym typeface="Arial"/>
+            </a:endParaRPr>
+          </a:p>
+          <a:p>
+            <a:pPr indent="-345445" lvl="1" marL="690890" marR="0" rtl="0" algn="l">
+              <a:lnSpc>
+                <a:spcPct val="140000"/>
+              </a:lnSpc>
+              <a:spcBef>
+                <a:spcPts val="0"/>
+              </a:spcBef>
+              <a:spcAft>
+                <a:spcPts val="0"/>
+              </a:spcAft>
+              <a:buClr>
+                <a:srgbClr val="000000"/>
+              </a:buClr>
+              <a:buSzPts val="3200"/>
+              <a:buFont typeface="Arial"/>
+              <a:buChar char="•"/>
+            </a:pPr>
+            <a:r>
+              <a:rPr b="1" i="0" lang="en-US" sz="3200" u="none" cap="none" strike="noStrike">
+                <a:solidFill>
+                  <a:srgbClr val="000000"/>
+                </a:solidFill>
+                <a:latin typeface="Open Sans"/>
+                <a:ea typeface="Open Sans"/>
+                <a:cs typeface="Open Sans"/>
+                <a:sym typeface="Open Sans"/>
+              </a:rPr>
+              <a:t>GitHub</a:t>
+            </a:r>
+            <a:endParaRPr b="0" i="0" sz="1400" u="none" cap="none" strike="noStrike">
+              <a:solidFill>
+                <a:srgbClr val="000000"/>
+              </a:solidFill>
+              <a:latin typeface="Arial"/>
+              <a:ea typeface="Arial"/>
+              <a:cs typeface="Arial"/>
+              <a:sym typeface="Arial"/>
+            </a:endParaRPr>
+          </a:p>
+        </p:txBody>
+      </p:sp>
+      <p:sp>
+        <p:nvSpPr>
+          <p:cNvPr id="135" name="Google Shape;135;p16"/>
+          <p:cNvSpPr txBox="1"/>
+          <p:nvPr/>
+        </p:nvSpPr>
+        <p:spPr>
+          <a:xfrm>
+            <a:off x="3062802" y="3716892"/>
+            <a:ext cx="13707597" cy="537844"/>
+          </a:xfrm>
+          <a:prstGeom prst="rect">
+            <a:avLst/>
+          </a:prstGeom>
+          <a:noFill/>
+          <a:ln>
+            <a:noFill/>
+          </a:ln>
+        </p:spPr>
+        <p:txBody>
+          <a:bodyPr anchorCtr="0" anchor="t" bIns="0" lIns="0" spcFirstLastPara="1" rIns="0" wrap="square" tIns="0">
+            <a:spAutoFit/>
+          </a:bodyPr>
+          <a:lstStyle/>
+          <a:p>
+            <a:pPr indent="0" lvl="0" marL="0" marR="0" rtl="0" algn="l">
+              <a:lnSpc>
+                <a:spcPct val="140000"/>
+              </a:lnSpc>
+              <a:spcBef>
+                <a:spcPts val="0"/>
+              </a:spcBef>
+              <a:spcAft>
+                <a:spcPts val="0"/>
+              </a:spcAft>
+              <a:buClr>
+                <a:srgbClr val="000000"/>
+              </a:buClr>
+              <a:buSzPts val="3200"/>
+              <a:buFont typeface="Arial"/>
+              <a:buNone/>
+            </a:pPr>
+            <a:r>
+              <a:rPr b="0" i="0" lang="en-US" sz="3200" u="none" cap="none" strike="noStrike">
+                <a:solidFill>
+                  <a:srgbClr val="000000"/>
+                </a:solidFill>
+                <a:latin typeface="Open Sans"/>
+                <a:ea typeface="Open Sans"/>
+                <a:cs typeface="Open Sans"/>
+                <a:sym typeface="Open Sans"/>
+              </a:rPr>
+              <a:t>Kommunikációra használt alkalmazások</a:t>
+            </a:r>
+            <a:endParaRPr b="0" i="0" sz="1400" u="none" cap="none" strike="noStrike">
+              <a:solidFill>
+                <a:srgbClr val="000000"/>
+              </a:solidFill>
+              <a:latin typeface="Arial"/>
+              <a:ea typeface="Arial"/>
+              <a:cs typeface="Arial"/>
+              <a:sym typeface="Arial"/>
+            </a:endParaRPr>
+          </a:p>
+        </p:txBody>
+      </p:sp>
+      <p:sp>
+        <p:nvSpPr>
+          <p:cNvPr id="136" name="Google Shape;136;p16"/>
+          <p:cNvSpPr/>
+          <p:nvPr/>
+        </p:nvSpPr>
+        <p:spPr>
+          <a:xfrm>
+            <a:off x="1730080" y="5017240"/>
+            <a:ext cx="609484" cy="609484"/>
+          </a:xfrm>
+          <a:custGeom>
+            <a:rect b="b" l="l" r="r" t="t"/>
+            <a:pathLst>
+              <a:path extrusionOk="0" h="609484" w="609484">
+                <a:moveTo>
+                  <a:pt x="0" y="0"/>
+                </a:moveTo>
+                <a:lnTo>
+                  <a:pt x="609484" y="0"/>
+                </a:lnTo>
+                <a:lnTo>
+                  <a:pt x="609484" y="609484"/>
+                </a:lnTo>
+                <a:lnTo>
+                  <a:pt x="0" y="609484"/>
                 </a:lnTo>
                 <a:lnTo>
                   <a:pt x="0" y="0"/>
@@ -18765,13 +19402,13 @@
       </p:sp>
       <p:sp>
         <p:nvSpPr>
-          <p:cNvPr id="119" name="Google Shape;119;p15"/>
+          <p:cNvPr id="137" name="Google Shape;137;p16"/>
           <p:cNvSpPr/>
           <p:nvPr/>
         </p:nvSpPr>
         <p:spPr>
           <a:xfrm>
-            <a:off x="9145091" y="2238995"/>
+            <a:off x="7963129" y="6512958"/>
             <a:ext cx="609484" cy="609484"/>
           </a:xfrm>
           <a:custGeom>
@@ -18782,13 +19419,60 @@
                   <a:pt x="0" y="0"/>
                 </a:moveTo>
                 <a:lnTo>
-                  <a:pt x="609484" y="0"/>
-                </a:lnTo>
-                <a:lnTo>
-                  <a:pt x="609484" y="609485"/>
-                </a:lnTo>
-                <a:lnTo>
-                  <a:pt x="0" y="609485"/>
+                  <a:pt x="609485" y="0"/>
+                </a:lnTo>
+                <a:lnTo>
+                  <a:pt x="609485" y="609484"/>
+                </a:lnTo>
+                <a:lnTo>
+                  <a:pt x="0" y="609484"/>
+                </a:lnTo>
+                <a:lnTo>
+                  <a:pt x="0" y="0"/>
+                </a:lnTo>
+                <a:close/>
+              </a:path>
+            </a:pathLst>
+          </a:custGeom>
+          <a:blipFill rotWithShape="1">
+            <a:blip r:embed="rId4">
+              <a:alphaModFix/>
+            </a:blip>
+            <a:stretch>
+              <a:fillRect b="0" l="0" r="0" t="0"/>
+            </a:stretch>
+          </a:blipFill>
+          <a:ln>
+            <a:noFill/>
+          </a:ln>
+        </p:spPr>
+      </p:sp>
+      <p:sp>
+        <p:nvSpPr>
+          <p:cNvPr id="138" name="Google Shape;138;p16"/>
+          <p:cNvSpPr/>
+          <p:nvPr/>
+        </p:nvSpPr>
+        <p:spPr>
+          <a:xfrm>
+            <a:off x="11320389" y="2656142"/>
+            <a:ext cx="609484" cy="609484"/>
+          </a:xfrm>
+          <a:custGeom>
+            <a:rect b="b" l="l" r="r" t="t"/>
+            <a:pathLst>
+              <a:path extrusionOk="0" h="609484" w="609484">
+                <a:moveTo>
+                  <a:pt x="0" y="0"/>
+                </a:moveTo>
+                <a:lnTo>
+                  <a:pt x="609485" y="0"/>
+                </a:lnTo>
+                <a:lnTo>
+                  <a:pt x="609485" y="609484"/>
+                </a:lnTo>
+                <a:lnTo>
+                  <a:pt x="0" y="609484"/>
                 </a:lnTo>
                 <a:lnTo>
                   <a:pt x="0" y="0"/>
@@ -18818,12 +19502,12 @@
 </p:sld>
 </file>
 
-<file path=ppt/slides/slide4.xml><?xml version="1.0" encoding="utf-8"?>
+<file path=ppt/slides/slide5.xml><?xml version="1.0" encoding="utf-8"?>
 <p:sld xmlns:a="http://schemas.openxmlformats.org/drawingml/2006/main" xmlns:r="http://schemas.openxmlformats.org/officeDocument/2006/relationships" xmlns:mc="http://schemas.openxmlformats.org/markup-compatibility/2006" xmlns:mv="urn:schemas-microsoft-com:mac:vml" xmlns:p="http://schemas.openxmlformats.org/presentationml/2006/main" xmlns:c="http://schemas.openxmlformats.org/drawingml/2006/chart" xmlns:dgm="http://schemas.openxmlformats.org/drawingml/2006/diagram" xmlns:o="urn:schemas-microsoft-com:office:office" xmlns:v="urn:schemas-microsoft-com:vml" xmlns:pvml="urn:schemas-microsoft-com:office:powerpoint" xmlns:com="http://schemas.openxmlformats.org/drawingml/2006/compatibility" xmlns:p14="http://schemas.microsoft.com/office/powerpoint/2010/main" xmlns:p15="http://schemas.microsoft.com/office/powerpoint/2012/main" xmlns:ahyp="http://schemas.microsoft.com/office/drawing/2018/hyperlinkcolor">
   <p:cSld>
     <p:spTree>
       <p:nvGrpSpPr>
-        <p:cNvPr id="123" name="Shape 123"/>
+        <p:cNvPr id="142" name="Shape 142"/>
         <p:cNvGrpSpPr/>
         <p:nvPr/>
       </p:nvGrpSpPr>
@@ -18837,7 +19521,7 @@
       </p:grpSpPr>
       <p:sp>
         <p:nvSpPr>
-          <p:cNvPr id="124" name="Google Shape;124;p16"/>
+          <p:cNvPr id="143" name="Google Shape;143;p17"/>
           <p:cNvSpPr/>
           <p:nvPr/>
         </p:nvSpPr>
@@ -18884,7 +19568,7 @@
       </p:sp>
       <p:cxnSp>
         <p:nvCxnSpPr>
-          <p:cNvPr id="125" name="Google Shape;125;p16"/>
+          <p:cNvPr id="144" name="Google Shape;144;p17"/>
           <p:cNvCxnSpPr/>
           <p:nvPr/>
         </p:nvCxnSpPr>
@@ -18910,61 +19594,146 @@
       </p:cxnSp>
       <p:sp>
         <p:nvSpPr>
-          <p:cNvPr id="126" name="Google Shape;126;p16"/>
-          <p:cNvSpPr/>
-          <p:nvPr/>
-        </p:nvSpPr>
-        <p:spPr>
-          <a:xfrm>
-            <a:off x="7675657" y="3089944"/>
-            <a:ext cx="951577" cy="951577"/>
-          </a:xfrm>
-          <a:custGeom>
-            <a:rect b="b" l="l" r="r" t="t"/>
-            <a:pathLst>
-              <a:path extrusionOk="0" h="951577" w="951577">
-                <a:moveTo>
-                  <a:pt x="0" y="0"/>
-                </a:moveTo>
-                <a:lnTo>
-                  <a:pt x="951578" y="0"/>
-                </a:lnTo>
-                <a:lnTo>
-                  <a:pt x="951578" y="951577"/>
-                </a:lnTo>
-                <a:lnTo>
-                  <a:pt x="0" y="951577"/>
-                </a:lnTo>
-                <a:lnTo>
-                  <a:pt x="0" y="0"/>
-                </a:lnTo>
-                <a:close/>
-              </a:path>
-            </a:pathLst>
-          </a:custGeom>
-          <a:blipFill rotWithShape="1">
-            <a:blip r:embed="rId4">
-              <a:alphaModFix/>
-            </a:blip>
-            <a:stretch>
-              <a:fillRect b="0" l="0" r="0" t="0"/>
-            </a:stretch>
-          </a:blipFill>
-          <a:ln>
-            <a:noFill/>
-          </a:ln>
-        </p:spPr>
-      </p:sp>
-      <p:sp>
-        <p:nvSpPr>
-          <p:cNvPr id="127" name="Google Shape;127;p16"/>
+          <p:cNvPr id="145" name="Google Shape;145;p17"/>
           <p:cNvSpPr txBox="1"/>
           <p:nvPr/>
         </p:nvSpPr>
         <p:spPr>
           <a:xfrm>
-            <a:off x="3839573" y="4458223"/>
-            <a:ext cx="8623746" cy="1661794"/>
+            <a:off x="6762600" y="350600"/>
+            <a:ext cx="4762800" cy="1108200"/>
+          </a:xfrm>
+          <a:prstGeom prst="rect">
+            <a:avLst/>
+          </a:prstGeom>
+          <a:noFill/>
+          <a:ln>
+            <a:noFill/>
+          </a:ln>
+        </p:spPr>
+        <p:txBody>
+          <a:bodyPr anchorCtr="0" anchor="t" bIns="0" lIns="0" spcFirstLastPara="1" rIns="0" wrap="square" tIns="0">
+            <a:spAutoFit/>
+          </a:bodyPr>
+          <a:lstStyle/>
+          <a:p>
+            <a:pPr indent="0" lvl="0" marL="0" marR="0" rtl="0" algn="ctr">
+              <a:lnSpc>
+                <a:spcPct val="140000"/>
+              </a:lnSpc>
+              <a:spcBef>
+                <a:spcPts val="0"/>
+              </a:spcBef>
+              <a:spcAft>
+                <a:spcPts val="0"/>
+              </a:spcAft>
+              <a:buClr>
+                <a:srgbClr val="000000"/>
+              </a:buClr>
+              <a:buSzPts val="7200"/>
+              <a:buFont typeface="Arial"/>
+              <a:buNone/>
+            </a:pPr>
+            <a:r>
+              <a:rPr b="1" i="0" lang="en-US" sz="7200" u="none" cap="none" strike="noStrike">
+                <a:solidFill>
+                  <a:srgbClr val="44CA84"/>
+                </a:solidFill>
+                <a:latin typeface="Open Sans"/>
+                <a:ea typeface="Open Sans"/>
+                <a:cs typeface="Open Sans"/>
+                <a:sym typeface="Open Sans"/>
+              </a:rPr>
+              <a:t>Funkciók</a:t>
+            </a:r>
+            <a:endParaRPr b="0" i="0" sz="1400" u="none" cap="none" strike="noStrike">
+              <a:solidFill>
+                <a:srgbClr val="000000"/>
+              </a:solidFill>
+              <a:latin typeface="Arial"/>
+              <a:ea typeface="Arial"/>
+              <a:cs typeface="Arial"/>
+              <a:sym typeface="Arial"/>
+            </a:endParaRPr>
+          </a:p>
+        </p:txBody>
+      </p:sp>
+      <p:sp>
+        <p:nvSpPr>
+          <p:cNvPr id="146" name="Google Shape;146;p17"/>
+          <p:cNvSpPr txBox="1"/>
+          <p:nvPr/>
+        </p:nvSpPr>
+        <p:spPr>
+          <a:xfrm>
+            <a:off x="3062802" y="2501746"/>
+            <a:ext cx="13707600" cy="492600"/>
+          </a:xfrm>
+          <a:prstGeom prst="rect">
+            <a:avLst/>
+          </a:prstGeom>
+          <a:noFill/>
+          <a:ln>
+            <a:noFill/>
+          </a:ln>
+        </p:spPr>
+        <p:txBody>
+          <a:bodyPr anchorCtr="0" anchor="t" bIns="0" lIns="0" spcFirstLastPara="1" rIns="0" wrap="square" tIns="0">
+            <a:spAutoFit/>
+          </a:bodyPr>
+          <a:lstStyle/>
+          <a:p>
+            <a:pPr indent="0" lvl="0" marL="0" marR="0" rtl="0" algn="l">
+              <a:lnSpc>
+                <a:spcPct val="140000"/>
+              </a:lnSpc>
+              <a:spcBef>
+                <a:spcPts val="0"/>
+              </a:spcBef>
+              <a:spcAft>
+                <a:spcPts val="0"/>
+              </a:spcAft>
+              <a:buClr>
+                <a:srgbClr val="000000"/>
+              </a:buClr>
+              <a:buSzPts val="3200"/>
+              <a:buFont typeface="Arial"/>
+              <a:buNone/>
+            </a:pPr>
+            <a:r>
+              <a:rPr b="0" i="0" lang="en-US" sz="3200" u="none" cap="none" strike="noStrike">
+                <a:solidFill>
+                  <a:srgbClr val="000000"/>
+                </a:solidFill>
+                <a:latin typeface="Open Sans"/>
+                <a:ea typeface="Open Sans"/>
+                <a:cs typeface="Open Sans"/>
+                <a:sym typeface="Open Sans"/>
+              </a:rPr>
+              <a:t>Autentikáció</a:t>
+            </a:r>
+            <a:endParaRPr b="0" i="0" sz="1400" u="none" cap="none" strike="noStrike">
+              <a:solidFill>
+                <a:srgbClr val="000000"/>
+              </a:solidFill>
+              <a:latin typeface="Arial"/>
+              <a:ea typeface="Arial"/>
+              <a:cs typeface="Arial"/>
+              <a:sym typeface="Arial"/>
+            </a:endParaRPr>
+          </a:p>
+        </p:txBody>
+      </p:sp>
+      <p:sp>
+        <p:nvSpPr>
+          <p:cNvPr id="147" name="Google Shape;147;p17"/>
+          <p:cNvSpPr txBox="1"/>
+          <p:nvPr/>
+        </p:nvSpPr>
+        <p:spPr>
+          <a:xfrm>
+            <a:off x="3839573" y="3118774"/>
+            <a:ext cx="8623800" cy="1182000"/>
           </a:xfrm>
           <a:prstGeom prst="rect">
             <a:avLst/>
@@ -19007,7 +19776,7 @@
                 <a:cs typeface="Open Sans"/>
                 <a:sym typeface="Open Sans"/>
               </a:rPr>
-              <a:t>Tailwind CSS</a:t>
+              <a:t>regisztráció</a:t>
             </a:r>
             <a:endParaRPr b="0" i="0" sz="1400" u="none" cap="none" strike="noStrike">
               <a:solidFill>
@@ -19047,47 +19816,7 @@
                 <a:cs typeface="Open Sans"/>
                 <a:sym typeface="Open Sans"/>
               </a:rPr>
-              <a:t>shadcn/ui</a:t>
-            </a:r>
-            <a:endParaRPr b="0" i="0" sz="1400" u="none" cap="none" strike="noStrike">
-              <a:solidFill>
-                <a:srgbClr val="000000"/>
-              </a:solidFill>
-              <a:latin typeface="Arial"/>
-              <a:ea typeface="Arial"/>
-              <a:cs typeface="Arial"/>
-              <a:sym typeface="Arial"/>
-            </a:endParaRPr>
-          </a:p>
-          <a:p>
-            <a:pPr indent="-345445" lvl="1" marL="690890" marR="0" rtl="0" algn="l">
-              <a:lnSpc>
-                <a:spcPct val="140000"/>
-              </a:lnSpc>
-              <a:spcBef>
-                <a:spcPts val="0"/>
-              </a:spcBef>
-              <a:spcAft>
-                <a:spcPts val="0"/>
-              </a:spcAft>
-              <a:buClr>
-                <a:srgbClr val="000000"/>
-              </a:buClr>
-              <a:buSzPts val="3200"/>
-              <a:buFont typeface="Arial"/>
-              <a:buChar char="•"/>
-            </a:pPr>
-            <a:r>
-              <a:rPr b="1" i="0" lang="en-US" sz="3200" u="none" cap="none" strike="noStrike">
-                <a:solidFill>
-                  <a:srgbClr val="000000"/>
-                </a:solidFill>
-                <a:latin typeface="Open Sans"/>
-                <a:ea typeface="Open Sans"/>
-                <a:cs typeface="Open Sans"/>
-                <a:sym typeface="Open Sans"/>
-              </a:rPr>
-              <a:t>Radix UI</a:t>
+              <a:t>bejelentkezés</a:t>
             </a:r>
             <a:endParaRPr b="0" i="0" sz="1400" u="none" cap="none" strike="noStrike">
               <a:solidFill>
@@ -19103,201 +19832,13 @@
       </p:sp>
       <p:sp>
         <p:nvSpPr>
-          <p:cNvPr id="128" name="Google Shape;128;p16"/>
-          <p:cNvSpPr/>
-          <p:nvPr/>
-        </p:nvSpPr>
-        <p:spPr>
-          <a:xfrm>
-            <a:off x="8966800" y="4843289"/>
-            <a:ext cx="949800" cy="949800"/>
-          </a:xfrm>
-          <a:custGeom>
-            <a:rect b="b" l="l" r="r" t="t"/>
-            <a:pathLst>
-              <a:path extrusionOk="0" h="949800" w="949800">
-                <a:moveTo>
-                  <a:pt x="0" y="0"/>
-                </a:moveTo>
-                <a:lnTo>
-                  <a:pt x="949800" y="0"/>
-                </a:lnTo>
-                <a:lnTo>
-                  <a:pt x="949800" y="949800"/>
-                </a:lnTo>
-                <a:lnTo>
-                  <a:pt x="0" y="949800"/>
-                </a:lnTo>
-                <a:lnTo>
-                  <a:pt x="0" y="0"/>
-                </a:lnTo>
-                <a:close/>
-              </a:path>
-            </a:pathLst>
-          </a:custGeom>
-          <a:blipFill rotWithShape="1">
-            <a:blip r:embed="rId5">
-              <a:alphaModFix/>
-            </a:blip>
-            <a:stretch>
-              <a:fillRect b="0" l="0" r="0" t="0"/>
-            </a:stretch>
-          </a:blipFill>
-          <a:ln>
-            <a:noFill/>
-          </a:ln>
-        </p:spPr>
-      </p:sp>
-      <p:sp>
-        <p:nvSpPr>
-          <p:cNvPr id="129" name="Google Shape;129;p16"/>
-          <p:cNvSpPr/>
-          <p:nvPr/>
-        </p:nvSpPr>
-        <p:spPr>
-          <a:xfrm>
-            <a:off x="7675657" y="4842301"/>
-            <a:ext cx="950788" cy="950788"/>
-          </a:xfrm>
-          <a:custGeom>
-            <a:rect b="b" l="l" r="r" t="t"/>
-            <a:pathLst>
-              <a:path extrusionOk="0" h="950788" w="950788">
-                <a:moveTo>
-                  <a:pt x="0" y="0"/>
-                </a:moveTo>
-                <a:lnTo>
-                  <a:pt x="950788" y="0"/>
-                </a:lnTo>
-                <a:lnTo>
-                  <a:pt x="950788" y="950788"/>
-                </a:lnTo>
-                <a:lnTo>
-                  <a:pt x="0" y="950788"/>
-                </a:lnTo>
-                <a:lnTo>
-                  <a:pt x="0" y="0"/>
-                </a:lnTo>
-                <a:close/>
-              </a:path>
-            </a:pathLst>
-          </a:custGeom>
-          <a:blipFill rotWithShape="1">
-            <a:blip r:embed="rId6">
-              <a:alphaModFix/>
-            </a:blip>
-            <a:stretch>
-              <a:fillRect b="0" l="0" r="0" t="0"/>
-            </a:stretch>
-          </a:blipFill>
-          <a:ln>
-            <a:noFill/>
-          </a:ln>
-        </p:spPr>
-      </p:sp>
-      <p:sp>
-        <p:nvSpPr>
-          <p:cNvPr id="130" name="Google Shape;130;p16"/>
-          <p:cNvSpPr/>
-          <p:nvPr/>
-        </p:nvSpPr>
-        <p:spPr>
-          <a:xfrm>
-            <a:off x="10259500" y="4843289"/>
-            <a:ext cx="951776" cy="951776"/>
-          </a:xfrm>
-          <a:custGeom>
-            <a:rect b="b" l="l" r="r" t="t"/>
-            <a:pathLst>
-              <a:path extrusionOk="0" h="951776" w="951776">
-                <a:moveTo>
-                  <a:pt x="0" y="0"/>
-                </a:moveTo>
-                <a:lnTo>
-                  <a:pt x="951777" y="0"/>
-                </a:lnTo>
-                <a:lnTo>
-                  <a:pt x="951777" y="951777"/>
-                </a:lnTo>
-                <a:lnTo>
-                  <a:pt x="0" y="951777"/>
-                </a:lnTo>
-                <a:lnTo>
-                  <a:pt x="0" y="0"/>
-                </a:lnTo>
-                <a:close/>
-              </a:path>
-            </a:pathLst>
-          </a:custGeom>
-          <a:blipFill rotWithShape="1">
-            <a:blip r:embed="rId7">
-              <a:alphaModFix/>
-            </a:blip>
-            <a:stretch>
-              <a:fillRect b="0" l="0" r="0" t="0"/>
-            </a:stretch>
-          </a:blipFill>
-          <a:ln>
-            <a:noFill/>
-          </a:ln>
-        </p:spPr>
-      </p:sp>
-      <p:sp>
-        <p:nvSpPr>
-          <p:cNvPr id="131" name="Google Shape;131;p16"/>
-          <p:cNvSpPr/>
-          <p:nvPr/>
-        </p:nvSpPr>
-        <p:spPr>
-          <a:xfrm>
-            <a:off x="7199466" y="6592742"/>
-            <a:ext cx="952382" cy="953831"/>
-          </a:xfrm>
-          <a:custGeom>
-            <a:rect b="b" l="l" r="r" t="t"/>
-            <a:pathLst>
-              <a:path extrusionOk="0" h="953831" w="952382">
-                <a:moveTo>
-                  <a:pt x="0" y="0"/>
-                </a:moveTo>
-                <a:lnTo>
-                  <a:pt x="952382" y="0"/>
-                </a:lnTo>
-                <a:lnTo>
-                  <a:pt x="952382" y="953831"/>
-                </a:lnTo>
-                <a:lnTo>
-                  <a:pt x="0" y="953831"/>
-                </a:lnTo>
-                <a:lnTo>
-                  <a:pt x="0" y="0"/>
-                </a:lnTo>
-                <a:close/>
-              </a:path>
-            </a:pathLst>
-          </a:custGeom>
-          <a:blipFill rotWithShape="1">
-            <a:blip r:embed="rId8">
-              <a:alphaModFix/>
-            </a:blip>
-            <a:stretch>
-              <a:fillRect b="0" l="0" r="0" t="-2933"/>
-            </a:stretch>
-          </a:blipFill>
-          <a:ln>
-            <a:noFill/>
-          </a:ln>
-        </p:spPr>
-      </p:sp>
-      <p:sp>
-        <p:nvSpPr>
-          <p:cNvPr id="132" name="Google Shape;132;p16"/>
+          <p:cNvPr id="148" name="Google Shape;148;p17"/>
           <p:cNvSpPr txBox="1"/>
           <p:nvPr/>
         </p:nvSpPr>
         <p:spPr>
           <a:xfrm>
-            <a:off x="3062802" y="2673083"/>
+            <a:off x="3062802" y="4425204"/>
             <a:ext cx="13707597" cy="537844"/>
           </a:xfrm>
           <a:prstGeom prst="rect">
@@ -19341,828 +19882,7 @@
                 <a:cs typeface="Open Sans"/>
                 <a:sym typeface="Open Sans"/>
               </a:rPr>
-              <a:t>Fullstack</a:t>
-            </a:r>
-            <a:endParaRPr b="0" i="0" sz="1400" u="none" cap="none" strike="noStrike">
-              <a:solidFill>
-                <a:srgbClr val="000000"/>
-              </a:solidFill>
-              <a:latin typeface="Arial"/>
-              <a:ea typeface="Arial"/>
-              <a:cs typeface="Arial"/>
-              <a:sym typeface="Arial"/>
-            </a:endParaRPr>
-          </a:p>
-        </p:txBody>
-      </p:sp>
-      <p:sp>
-        <p:nvSpPr>
-          <p:cNvPr id="133" name="Google Shape;133;p16"/>
-          <p:cNvSpPr txBox="1"/>
-          <p:nvPr/>
-        </p:nvSpPr>
-        <p:spPr>
-          <a:xfrm>
-            <a:off x="3062802" y="6237292"/>
-            <a:ext cx="13707600" cy="492600"/>
-          </a:xfrm>
-          <a:prstGeom prst="rect">
-            <a:avLst/>
-          </a:prstGeom>
-          <a:noFill/>
-          <a:ln>
-            <a:noFill/>
-          </a:ln>
-        </p:spPr>
-        <p:txBody>
-          <a:bodyPr anchorCtr="0" anchor="t" bIns="0" lIns="0" spcFirstLastPara="1" rIns="0" wrap="square" tIns="0">
-            <a:spAutoFit/>
-          </a:bodyPr>
-          <a:lstStyle/>
-          <a:p>
-            <a:pPr indent="0" lvl="0" marL="0" marR="0" rtl="0" algn="l">
-              <a:lnSpc>
-                <a:spcPct val="140000"/>
-              </a:lnSpc>
-              <a:spcBef>
-                <a:spcPts val="0"/>
-              </a:spcBef>
-              <a:spcAft>
-                <a:spcPts val="0"/>
-              </a:spcAft>
-              <a:buClr>
-                <a:srgbClr val="000000"/>
-              </a:buClr>
-              <a:buSzPts val="3200"/>
-              <a:buFont typeface="Arial"/>
-              <a:buNone/>
-            </a:pPr>
-            <a:r>
-              <a:rPr b="0" i="0" lang="en-US" sz="3200" u="none" cap="none" strike="noStrike">
-                <a:solidFill>
-                  <a:srgbClr val="000000"/>
-                </a:solidFill>
-                <a:latin typeface="Open Sans"/>
-                <a:ea typeface="Open Sans"/>
-                <a:cs typeface="Open Sans"/>
-                <a:sym typeface="Open Sans"/>
-              </a:rPr>
-              <a:t>Adatbázis</a:t>
-            </a:r>
-            <a:endParaRPr b="0" i="0" sz="1400" u="none" cap="none" strike="noStrike">
-              <a:solidFill>
-                <a:srgbClr val="000000"/>
-              </a:solidFill>
-              <a:latin typeface="Arial"/>
-              <a:ea typeface="Arial"/>
-              <a:cs typeface="Arial"/>
-              <a:sym typeface="Arial"/>
-            </a:endParaRPr>
-          </a:p>
-        </p:txBody>
-      </p:sp>
-      <p:sp>
-        <p:nvSpPr>
-          <p:cNvPr id="134" name="Google Shape;134;p16"/>
-          <p:cNvSpPr txBox="1"/>
-          <p:nvPr/>
-        </p:nvSpPr>
-        <p:spPr>
-          <a:xfrm>
-            <a:off x="3839573" y="6772161"/>
-            <a:ext cx="8623746" cy="537844"/>
-          </a:xfrm>
-          <a:prstGeom prst="rect">
-            <a:avLst/>
-          </a:prstGeom>
-          <a:noFill/>
-          <a:ln>
-            <a:noFill/>
-          </a:ln>
-        </p:spPr>
-        <p:txBody>
-          <a:bodyPr anchorCtr="0" anchor="t" bIns="0" lIns="0" spcFirstLastPara="1" rIns="0" wrap="square" tIns="0">
-            <a:spAutoFit/>
-          </a:bodyPr>
-          <a:lstStyle/>
-          <a:p>
-            <a:pPr indent="-345445" lvl="1" marL="690890" marR="0" rtl="0" algn="l">
-              <a:lnSpc>
-                <a:spcPct val="140000"/>
-              </a:lnSpc>
-              <a:spcBef>
-                <a:spcPts val="0"/>
-              </a:spcBef>
-              <a:spcAft>
-                <a:spcPts val="0"/>
-              </a:spcAft>
-              <a:buClr>
-                <a:srgbClr val="000000"/>
-              </a:buClr>
-              <a:buSzPts val="3200"/>
-              <a:buFont typeface="Arial"/>
-              <a:buChar char="•"/>
-            </a:pPr>
-            <a:r>
-              <a:rPr b="1" i="0" lang="en-US" sz="3200" u="none" cap="none" strike="noStrike">
-                <a:solidFill>
-                  <a:srgbClr val="000000"/>
-                </a:solidFill>
-                <a:latin typeface="Open Sans"/>
-                <a:ea typeface="Open Sans"/>
-                <a:cs typeface="Open Sans"/>
-                <a:sym typeface="Open Sans"/>
-              </a:rPr>
-              <a:t>PostgreSQL</a:t>
-            </a:r>
-            <a:endParaRPr b="0" i="0" sz="1400" u="none" cap="none" strike="noStrike">
-              <a:solidFill>
-                <a:srgbClr val="000000"/>
-              </a:solidFill>
-              <a:latin typeface="Arial"/>
-              <a:ea typeface="Arial"/>
-              <a:cs typeface="Arial"/>
-              <a:sym typeface="Arial"/>
-            </a:endParaRPr>
-          </a:p>
-        </p:txBody>
-      </p:sp>
-      <p:sp>
-        <p:nvSpPr>
-          <p:cNvPr id="135" name="Google Shape;135;p16"/>
-          <p:cNvSpPr/>
-          <p:nvPr/>
-        </p:nvSpPr>
-        <p:spPr>
-          <a:xfrm>
-            <a:off x="1601313" y="5317695"/>
-            <a:ext cx="609484" cy="609484"/>
-          </a:xfrm>
-          <a:custGeom>
-            <a:rect b="b" l="l" r="r" t="t"/>
-            <a:pathLst>
-              <a:path extrusionOk="0" h="609484" w="609484">
-                <a:moveTo>
-                  <a:pt x="0" y="0"/>
-                </a:moveTo>
-                <a:lnTo>
-                  <a:pt x="609485" y="0"/>
-                </a:lnTo>
-                <a:lnTo>
-                  <a:pt x="609485" y="609485"/>
-                </a:lnTo>
-                <a:lnTo>
-                  <a:pt x="0" y="609485"/>
-                </a:lnTo>
-                <a:lnTo>
-                  <a:pt x="0" y="0"/>
-                </a:lnTo>
-                <a:close/>
-              </a:path>
-            </a:pathLst>
-          </a:custGeom>
-          <a:blipFill rotWithShape="1">
-            <a:blip r:embed="rId9">
-              <a:alphaModFix/>
-            </a:blip>
-            <a:stretch>
-              <a:fillRect b="0" l="0" r="0" t="0"/>
-            </a:stretch>
-          </a:blipFill>
-          <a:ln>
-            <a:noFill/>
-          </a:ln>
-        </p:spPr>
-      </p:sp>
-      <p:sp>
-        <p:nvSpPr>
-          <p:cNvPr id="136" name="Google Shape;136;p16"/>
-          <p:cNvSpPr/>
-          <p:nvPr/>
-        </p:nvSpPr>
-        <p:spPr>
-          <a:xfrm>
-            <a:off x="9144000" y="8262505"/>
-            <a:ext cx="609484" cy="609484"/>
-          </a:xfrm>
-          <a:custGeom>
-            <a:rect b="b" l="l" r="r" t="t"/>
-            <a:pathLst>
-              <a:path extrusionOk="0" h="609484" w="609484">
-                <a:moveTo>
-                  <a:pt x="0" y="0"/>
-                </a:moveTo>
-                <a:lnTo>
-                  <a:pt x="609484" y="0"/>
-                </a:lnTo>
-                <a:lnTo>
-                  <a:pt x="609484" y="609484"/>
-                </a:lnTo>
-                <a:lnTo>
-                  <a:pt x="0" y="609484"/>
-                </a:lnTo>
-                <a:lnTo>
-                  <a:pt x="0" y="0"/>
-                </a:lnTo>
-                <a:close/>
-              </a:path>
-            </a:pathLst>
-          </a:custGeom>
-          <a:blipFill rotWithShape="1">
-            <a:blip r:embed="rId9">
-              <a:alphaModFix/>
-            </a:blip>
-            <a:stretch>
-              <a:fillRect b="0" l="0" r="0" t="0"/>
-            </a:stretch>
-          </a:blipFill>
-          <a:ln>
-            <a:noFill/>
-          </a:ln>
-        </p:spPr>
-      </p:sp>
-      <p:sp>
-        <p:nvSpPr>
-          <p:cNvPr id="137" name="Google Shape;137;p16"/>
-          <p:cNvSpPr/>
-          <p:nvPr/>
-        </p:nvSpPr>
-        <p:spPr>
-          <a:xfrm>
-            <a:off x="11853835" y="2006448"/>
-            <a:ext cx="609484" cy="609484"/>
-          </a:xfrm>
-          <a:custGeom>
-            <a:rect b="b" l="l" r="r" t="t"/>
-            <a:pathLst>
-              <a:path extrusionOk="0" h="609484" w="609484">
-                <a:moveTo>
-                  <a:pt x="0" y="0"/>
-                </a:moveTo>
-                <a:lnTo>
-                  <a:pt x="609484" y="0"/>
-                </a:lnTo>
-                <a:lnTo>
-                  <a:pt x="609484" y="609485"/>
-                </a:lnTo>
-                <a:lnTo>
-                  <a:pt x="0" y="609485"/>
-                </a:lnTo>
-                <a:lnTo>
-                  <a:pt x="0" y="0"/>
-                </a:lnTo>
-                <a:close/>
-              </a:path>
-            </a:pathLst>
-          </a:custGeom>
-          <a:blipFill rotWithShape="1">
-            <a:blip r:embed="rId9">
-              <a:alphaModFix/>
-            </a:blip>
-            <a:stretch>
-              <a:fillRect b="0" l="0" r="0" t="0"/>
-            </a:stretch>
-          </a:blipFill>
-          <a:ln>
-            <a:noFill/>
-          </a:ln>
-        </p:spPr>
-      </p:sp>
-      <p:sp>
-        <p:nvSpPr>
-          <p:cNvPr id="138" name="Google Shape;138;p16"/>
-          <p:cNvSpPr txBox="1"/>
-          <p:nvPr/>
-        </p:nvSpPr>
-        <p:spPr>
-          <a:xfrm>
-            <a:off x="5725500" y="383950"/>
-            <a:ext cx="6837000" cy="1108200"/>
-          </a:xfrm>
-          <a:prstGeom prst="rect">
-            <a:avLst/>
-          </a:prstGeom>
-          <a:noFill/>
-          <a:ln>
-            <a:noFill/>
-          </a:ln>
-        </p:spPr>
-        <p:txBody>
-          <a:bodyPr anchorCtr="0" anchor="t" bIns="0" lIns="0" spcFirstLastPara="1" rIns="0" wrap="square" tIns="0">
-            <a:spAutoFit/>
-          </a:bodyPr>
-          <a:lstStyle/>
-          <a:p>
-            <a:pPr indent="0" lvl="0" marL="0" marR="0" rtl="0" algn="ctr">
-              <a:lnSpc>
-                <a:spcPct val="140000"/>
-              </a:lnSpc>
-              <a:spcBef>
-                <a:spcPts val="0"/>
-              </a:spcBef>
-              <a:spcAft>
-                <a:spcPts val="0"/>
-              </a:spcAft>
-              <a:buClr>
-                <a:srgbClr val="000000"/>
-              </a:buClr>
-              <a:buSzPts val="7200"/>
-              <a:buFont typeface="Arial"/>
-              <a:buNone/>
-            </a:pPr>
-            <a:r>
-              <a:rPr b="1" i="0" lang="en-US" sz="7200" u="none" cap="none" strike="noStrike">
-                <a:solidFill>
-                  <a:srgbClr val="44CA84"/>
-                </a:solidFill>
-                <a:latin typeface="Open Sans"/>
-                <a:ea typeface="Open Sans"/>
-                <a:cs typeface="Open Sans"/>
-                <a:sym typeface="Open Sans"/>
-              </a:rPr>
-              <a:t>Tech stack</a:t>
-            </a:r>
-            <a:endParaRPr b="0" i="0" sz="1400" u="none" cap="none" strike="noStrike">
-              <a:solidFill>
-                <a:srgbClr val="000000"/>
-              </a:solidFill>
-              <a:latin typeface="Arial"/>
-              <a:ea typeface="Arial"/>
-              <a:cs typeface="Arial"/>
-              <a:sym typeface="Arial"/>
-            </a:endParaRPr>
-          </a:p>
-        </p:txBody>
-      </p:sp>
-      <p:sp>
-        <p:nvSpPr>
-          <p:cNvPr id="139" name="Google Shape;139;p16"/>
-          <p:cNvSpPr txBox="1"/>
-          <p:nvPr/>
-        </p:nvSpPr>
-        <p:spPr>
-          <a:xfrm>
-            <a:off x="3839573" y="3268236"/>
-            <a:ext cx="8623746" cy="537844"/>
-          </a:xfrm>
-          <a:prstGeom prst="rect">
-            <a:avLst/>
-          </a:prstGeom>
-          <a:noFill/>
-          <a:ln>
-            <a:noFill/>
-          </a:ln>
-        </p:spPr>
-        <p:txBody>
-          <a:bodyPr anchorCtr="0" anchor="t" bIns="0" lIns="0" spcFirstLastPara="1" rIns="0" wrap="square" tIns="0">
-            <a:spAutoFit/>
-          </a:bodyPr>
-          <a:lstStyle/>
-          <a:p>
-            <a:pPr indent="-345445" lvl="1" marL="690890" marR="0" rtl="0" algn="l">
-              <a:lnSpc>
-                <a:spcPct val="140000"/>
-              </a:lnSpc>
-              <a:spcBef>
-                <a:spcPts val="0"/>
-              </a:spcBef>
-              <a:spcAft>
-                <a:spcPts val="0"/>
-              </a:spcAft>
-              <a:buClr>
-                <a:srgbClr val="000000"/>
-              </a:buClr>
-              <a:buSzPts val="3200"/>
-              <a:buFont typeface="Arial"/>
-              <a:buChar char="•"/>
-            </a:pPr>
-            <a:r>
-              <a:rPr b="1" i="0" lang="en-US" sz="3200" u="none" cap="none" strike="noStrike">
-                <a:solidFill>
-                  <a:srgbClr val="000000"/>
-                </a:solidFill>
-                <a:latin typeface="Open Sans"/>
-                <a:ea typeface="Open Sans"/>
-                <a:cs typeface="Open Sans"/>
-                <a:sym typeface="Open Sans"/>
-              </a:rPr>
-              <a:t>Next.js 15.2.3</a:t>
-            </a:r>
-            <a:endParaRPr b="0" i="0" sz="1400" u="none" cap="none" strike="noStrike">
-              <a:solidFill>
-                <a:srgbClr val="000000"/>
-              </a:solidFill>
-              <a:latin typeface="Arial"/>
-              <a:ea typeface="Arial"/>
-              <a:cs typeface="Arial"/>
-              <a:sym typeface="Arial"/>
-            </a:endParaRPr>
-          </a:p>
-        </p:txBody>
-      </p:sp>
-      <p:sp>
-        <p:nvSpPr>
-          <p:cNvPr id="140" name="Google Shape;140;p16"/>
-          <p:cNvSpPr txBox="1"/>
-          <p:nvPr/>
-        </p:nvSpPr>
-        <p:spPr>
-          <a:xfrm>
-            <a:off x="3062802" y="3863229"/>
-            <a:ext cx="13707597" cy="537844"/>
-          </a:xfrm>
-          <a:prstGeom prst="rect">
-            <a:avLst/>
-          </a:prstGeom>
-          <a:noFill/>
-          <a:ln>
-            <a:noFill/>
-          </a:ln>
-        </p:spPr>
-        <p:txBody>
-          <a:bodyPr anchorCtr="0" anchor="t" bIns="0" lIns="0" spcFirstLastPara="1" rIns="0" wrap="square" tIns="0">
-            <a:spAutoFit/>
-          </a:bodyPr>
-          <a:lstStyle/>
-          <a:p>
-            <a:pPr indent="0" lvl="0" marL="0" marR="0" rtl="0" algn="l">
-              <a:lnSpc>
-                <a:spcPct val="140000"/>
-              </a:lnSpc>
-              <a:spcBef>
-                <a:spcPts val="0"/>
-              </a:spcBef>
-              <a:spcAft>
-                <a:spcPts val="0"/>
-              </a:spcAft>
-              <a:buClr>
-                <a:srgbClr val="000000"/>
-              </a:buClr>
-              <a:buSzPts val="3200"/>
-              <a:buFont typeface="Arial"/>
-              <a:buNone/>
-            </a:pPr>
-            <a:r>
-              <a:rPr b="0" i="0" lang="en-US" sz="3200" u="none" cap="none" strike="noStrike">
-                <a:solidFill>
-                  <a:srgbClr val="000000"/>
-                </a:solidFill>
-                <a:latin typeface="Open Sans"/>
-                <a:ea typeface="Open Sans"/>
-                <a:cs typeface="Open Sans"/>
-                <a:sym typeface="Open Sans"/>
-              </a:rPr>
-              <a:t>UI könyvtárak</a:t>
-            </a:r>
-            <a:endParaRPr b="0" i="0" sz="1400" u="none" cap="none" strike="noStrike">
-              <a:solidFill>
-                <a:srgbClr val="000000"/>
-              </a:solidFill>
-              <a:latin typeface="Arial"/>
-              <a:ea typeface="Arial"/>
-              <a:cs typeface="Arial"/>
-              <a:sym typeface="Arial"/>
-            </a:endParaRPr>
-          </a:p>
-        </p:txBody>
-      </p:sp>
-    </p:spTree>
-  </p:cSld>
-  <p:clrMapOvr>
-    <a:masterClrMapping/>
-  </p:clrMapOvr>
-</p:sld>
-</file>
-
-<file path=ppt/slides/slide5.xml><?xml version="1.0" encoding="utf-8"?>
-<p:sld xmlns:a="http://schemas.openxmlformats.org/drawingml/2006/main" xmlns:r="http://schemas.openxmlformats.org/officeDocument/2006/relationships" xmlns:mc="http://schemas.openxmlformats.org/markup-compatibility/2006" xmlns:mv="urn:schemas-microsoft-com:mac:vml" xmlns:p="http://schemas.openxmlformats.org/presentationml/2006/main" xmlns:c="http://schemas.openxmlformats.org/drawingml/2006/chart" xmlns:dgm="http://schemas.openxmlformats.org/drawingml/2006/diagram" xmlns:o="urn:schemas-microsoft-com:office:office" xmlns:v="urn:schemas-microsoft-com:vml" xmlns:pvml="urn:schemas-microsoft-com:office:powerpoint" xmlns:com="http://schemas.openxmlformats.org/drawingml/2006/compatibility" xmlns:p14="http://schemas.microsoft.com/office/powerpoint/2010/main" xmlns:p15="http://schemas.microsoft.com/office/powerpoint/2012/main" xmlns:ahyp="http://schemas.microsoft.com/office/drawing/2018/hyperlinkcolor">
-  <p:cSld>
-    <p:spTree>
-      <p:nvGrpSpPr>
-        <p:cNvPr id="144" name="Shape 144"/>
-        <p:cNvGrpSpPr/>
-        <p:nvPr/>
-      </p:nvGrpSpPr>
-      <p:grpSpPr>
-        <a:xfrm>
-          <a:off x="0" y="0"/>
-          <a:ext cx="0" cy="0"/>
-          <a:chOff x="0" y="0"/>
-          <a:chExt cx="0" cy="0"/>
-        </a:xfrm>
-      </p:grpSpPr>
-      <p:sp>
-        <p:nvSpPr>
-          <p:cNvPr id="145" name="Google Shape;145;p17"/>
-          <p:cNvSpPr/>
-          <p:nvPr/>
-        </p:nvSpPr>
-        <p:spPr>
-          <a:xfrm>
-            <a:off x="415650" y="407749"/>
-            <a:ext cx="1226101" cy="1241901"/>
-          </a:xfrm>
-          <a:custGeom>
-            <a:rect b="b" l="l" r="r" t="t"/>
-            <a:pathLst>
-              <a:path extrusionOk="0" h="1241901" w="1226101">
-                <a:moveTo>
-                  <a:pt x="0" y="0"/>
-                </a:moveTo>
-                <a:lnTo>
-                  <a:pt x="1226100" y="0"/>
-                </a:lnTo>
-                <a:lnTo>
-                  <a:pt x="1226100" y="1241902"/>
-                </a:lnTo>
-                <a:lnTo>
-                  <a:pt x="0" y="1241902"/>
-                </a:lnTo>
-                <a:lnTo>
-                  <a:pt x="0" y="0"/>
-                </a:lnTo>
-                <a:close/>
-              </a:path>
-            </a:pathLst>
-          </a:custGeom>
-          <a:blipFill rotWithShape="1">
-            <a:blip r:embed="rId3">
-              <a:alphaModFix/>
-            </a:blip>
-            <a:stretch>
-              <a:fillRect b="0" l="0" r="0" t="0"/>
-            </a:stretch>
-          </a:blipFill>
-          <a:ln>
-            <a:noFill/>
-          </a:ln>
-        </p:spPr>
-      </p:sp>
-      <p:cxnSp>
-        <p:nvCxnSpPr>
-          <p:cNvPr id="146" name="Google Shape;146;p17"/>
-          <p:cNvCxnSpPr/>
-          <p:nvPr/>
-        </p:nvCxnSpPr>
-        <p:spPr>
-          <a:xfrm>
-            <a:off x="-163821" y="10267950"/>
-            <a:ext cx="18451821" cy="19050"/>
-          </a:xfrm>
-          <a:prstGeom prst="straightConnector1">
-            <a:avLst/>
-          </a:prstGeom>
-          <a:noFill/>
-          <a:ln cap="flat" cmpd="sng" w="190500">
-            <a:solidFill>
-              <a:srgbClr val="44CA84"/>
-            </a:solidFill>
-            <a:prstDash val="solid"/>
-            <a:round/>
-            <a:headEnd len="sm" w="sm" type="none"/>
-            <a:tailEnd len="sm" w="sm" type="none"/>
-          </a:ln>
-        </p:spPr>
-      </p:cxnSp>
-      <p:sp>
-        <p:nvSpPr>
-          <p:cNvPr id="147" name="Google Shape;147;p17"/>
-          <p:cNvSpPr txBox="1"/>
-          <p:nvPr/>
-        </p:nvSpPr>
-        <p:spPr>
-          <a:xfrm>
-            <a:off x="5856982" y="348621"/>
-            <a:ext cx="6574036" cy="1226808"/>
-          </a:xfrm>
-          <a:prstGeom prst="rect">
-            <a:avLst/>
-          </a:prstGeom>
-          <a:noFill/>
-          <a:ln>
-            <a:noFill/>
-          </a:ln>
-        </p:spPr>
-        <p:txBody>
-          <a:bodyPr anchorCtr="0" anchor="t" bIns="0" lIns="0" spcFirstLastPara="1" rIns="0" wrap="square" tIns="0">
-            <a:spAutoFit/>
-          </a:bodyPr>
-          <a:lstStyle/>
-          <a:p>
-            <a:pPr indent="0" lvl="0" marL="0" marR="0" rtl="0" algn="ctr">
-              <a:lnSpc>
-                <a:spcPct val="140000"/>
-              </a:lnSpc>
-              <a:spcBef>
-                <a:spcPts val="0"/>
-              </a:spcBef>
-              <a:spcAft>
-                <a:spcPts val="0"/>
-              </a:spcAft>
-              <a:buClr>
-                <a:srgbClr val="000000"/>
-              </a:buClr>
-              <a:buSzPts val="7200"/>
-              <a:buFont typeface="Arial"/>
-              <a:buNone/>
-            </a:pPr>
-            <a:r>
-              <a:rPr b="1" i="0" lang="en-US" sz="7200" u="none" cap="none" strike="noStrike">
-                <a:solidFill>
-                  <a:srgbClr val="44CA84"/>
-                </a:solidFill>
-                <a:latin typeface="Open Sans"/>
-                <a:ea typeface="Open Sans"/>
-                <a:cs typeface="Open Sans"/>
-                <a:sym typeface="Open Sans"/>
-              </a:rPr>
-              <a:t> Csapatmunka</a:t>
-            </a:r>
-            <a:endParaRPr b="0" i="0" sz="1400" u="none" cap="none" strike="noStrike">
-              <a:solidFill>
-                <a:srgbClr val="000000"/>
-              </a:solidFill>
-              <a:latin typeface="Arial"/>
-              <a:ea typeface="Arial"/>
-              <a:cs typeface="Arial"/>
-              <a:sym typeface="Arial"/>
-            </a:endParaRPr>
-          </a:p>
-        </p:txBody>
-      </p:sp>
-      <p:sp>
-        <p:nvSpPr>
-          <p:cNvPr id="148" name="Google Shape;148;p17"/>
-          <p:cNvSpPr txBox="1"/>
-          <p:nvPr/>
-        </p:nvSpPr>
-        <p:spPr>
-          <a:xfrm>
-            <a:off x="3835402" y="4289189"/>
-            <a:ext cx="13707597" cy="2223769"/>
-          </a:xfrm>
-          <a:prstGeom prst="rect">
-            <a:avLst/>
-          </a:prstGeom>
-          <a:noFill/>
-          <a:ln>
-            <a:noFill/>
-          </a:ln>
-        </p:spPr>
-        <p:txBody>
-          <a:bodyPr anchorCtr="0" anchor="t" bIns="0" lIns="0" spcFirstLastPara="1" rIns="0" wrap="square" tIns="0">
-            <a:spAutoFit/>
-          </a:bodyPr>
-          <a:lstStyle/>
-          <a:p>
-            <a:pPr indent="-345445" lvl="1" marL="690890" marR="0" rtl="0" algn="l">
-              <a:lnSpc>
-                <a:spcPct val="140000"/>
-              </a:lnSpc>
-              <a:spcBef>
-                <a:spcPts val="0"/>
-              </a:spcBef>
-              <a:spcAft>
-                <a:spcPts val="0"/>
-              </a:spcAft>
-              <a:buClr>
-                <a:srgbClr val="000000"/>
-              </a:buClr>
-              <a:buSzPts val="3200"/>
-              <a:buFont typeface="Arial"/>
-              <a:buChar char="•"/>
-            </a:pPr>
-            <a:r>
-              <a:rPr b="1" i="0" lang="en-US" sz="3200" u="none" cap="none" strike="noStrike">
-                <a:solidFill>
-                  <a:srgbClr val="000000"/>
-                </a:solidFill>
-                <a:latin typeface="Open Sans"/>
-                <a:ea typeface="Open Sans"/>
-                <a:cs typeface="Open Sans"/>
-                <a:sym typeface="Open Sans"/>
-              </a:rPr>
-              <a:t>Discord</a:t>
-            </a:r>
-            <a:endParaRPr b="0" i="0" sz="1400" u="none" cap="none" strike="noStrike">
-              <a:solidFill>
-                <a:srgbClr val="000000"/>
-              </a:solidFill>
-              <a:latin typeface="Arial"/>
-              <a:ea typeface="Arial"/>
-              <a:cs typeface="Arial"/>
-              <a:sym typeface="Arial"/>
-            </a:endParaRPr>
-          </a:p>
-          <a:p>
-            <a:pPr indent="-345445" lvl="1" marL="690890" marR="0" rtl="0" algn="l">
-              <a:lnSpc>
-                <a:spcPct val="140000"/>
-              </a:lnSpc>
-              <a:spcBef>
-                <a:spcPts val="0"/>
-              </a:spcBef>
-              <a:spcAft>
-                <a:spcPts val="0"/>
-              </a:spcAft>
-              <a:buClr>
-                <a:srgbClr val="000000"/>
-              </a:buClr>
-              <a:buSzPts val="3200"/>
-              <a:buFont typeface="Arial"/>
-              <a:buChar char="•"/>
-            </a:pPr>
-            <a:r>
-              <a:rPr b="1" i="0" lang="en-US" sz="3200" u="none" cap="none" strike="noStrike">
-                <a:solidFill>
-                  <a:srgbClr val="000000"/>
-                </a:solidFill>
-                <a:latin typeface="Open Sans"/>
-                <a:ea typeface="Open Sans"/>
-                <a:cs typeface="Open Sans"/>
-                <a:sym typeface="Open Sans"/>
-              </a:rPr>
-              <a:t>Slack</a:t>
-            </a:r>
-            <a:endParaRPr b="0" i="0" sz="1400" u="none" cap="none" strike="noStrike">
-              <a:solidFill>
-                <a:srgbClr val="000000"/>
-              </a:solidFill>
-              <a:latin typeface="Arial"/>
-              <a:ea typeface="Arial"/>
-              <a:cs typeface="Arial"/>
-              <a:sym typeface="Arial"/>
-            </a:endParaRPr>
-          </a:p>
-          <a:p>
-            <a:pPr indent="-345445" lvl="1" marL="690890" marR="0" rtl="0" algn="l">
-              <a:lnSpc>
-                <a:spcPct val="140000"/>
-              </a:lnSpc>
-              <a:spcBef>
-                <a:spcPts val="0"/>
-              </a:spcBef>
-              <a:spcAft>
-                <a:spcPts val="0"/>
-              </a:spcAft>
-              <a:buClr>
-                <a:srgbClr val="000000"/>
-              </a:buClr>
-              <a:buSzPts val="3200"/>
-              <a:buFont typeface="Arial"/>
-              <a:buChar char="•"/>
-            </a:pPr>
-            <a:r>
-              <a:rPr b="1" i="0" lang="en-US" sz="3200" u="none" cap="none" strike="noStrike">
-                <a:solidFill>
-                  <a:srgbClr val="000000"/>
-                </a:solidFill>
-                <a:latin typeface="Open Sans"/>
-                <a:ea typeface="Open Sans"/>
-                <a:cs typeface="Open Sans"/>
-                <a:sym typeface="Open Sans"/>
-              </a:rPr>
-              <a:t>GitHub</a:t>
-            </a:r>
-            <a:endParaRPr b="0" i="0" sz="1400" u="none" cap="none" strike="noStrike">
-              <a:solidFill>
-                <a:srgbClr val="000000"/>
-              </a:solidFill>
-              <a:latin typeface="Arial"/>
-              <a:ea typeface="Arial"/>
-              <a:cs typeface="Arial"/>
-              <a:sym typeface="Arial"/>
-            </a:endParaRPr>
-          </a:p>
-          <a:p>
-            <a:pPr indent="-345445" lvl="1" marL="690890" marR="0" rtl="0" algn="l">
-              <a:lnSpc>
-                <a:spcPct val="140000"/>
-              </a:lnSpc>
-              <a:spcBef>
-                <a:spcPts val="0"/>
-              </a:spcBef>
-              <a:spcAft>
-                <a:spcPts val="0"/>
-              </a:spcAft>
-              <a:buClr>
-                <a:srgbClr val="000000"/>
-              </a:buClr>
-              <a:buSzPts val="3200"/>
-              <a:buFont typeface="Arial"/>
-              <a:buChar char="•"/>
-            </a:pPr>
-            <a:r>
-              <a:rPr b="1" i="0" lang="en-US" sz="3200" u="none" cap="none" strike="noStrike">
-                <a:solidFill>
-                  <a:srgbClr val="000000"/>
-                </a:solidFill>
-                <a:latin typeface="Open Sans"/>
-                <a:ea typeface="Open Sans"/>
-                <a:cs typeface="Open Sans"/>
-                <a:sym typeface="Open Sans"/>
-              </a:rPr>
-              <a:t>Jira</a:t>
+              <a:t>Fő funkciók</a:t>
             </a:r>
             <a:endParaRPr b="0" i="0" sz="1400" u="none" cap="none" strike="noStrike">
               <a:solidFill>
@@ -20184,8 +19904,8 @@
         </p:nvSpPr>
         <p:spPr>
           <a:xfrm>
-            <a:off x="3062802" y="3716892"/>
-            <a:ext cx="13707597" cy="537844"/>
+            <a:off x="3839573" y="5020198"/>
+            <a:ext cx="8623746" cy="3909694"/>
           </a:xfrm>
           <a:prstGeom prst="rect">
             <a:avLst/>
@@ -20201,7 +19921,7 @@
           </a:bodyPr>
           <a:lstStyle/>
           <a:p>
-            <a:pPr indent="0" lvl="0" marL="0" marR="0" rtl="0" algn="l">
+            <a:pPr indent="-345445" lvl="1" marL="690890" marR="0" rtl="0" algn="l">
               <a:lnSpc>
                 <a:spcPct val="140000"/>
               </a:lnSpc>
@@ -20216,10 +19936,10 @@
               </a:buClr>
               <a:buSzPts val="3200"/>
               <a:buFont typeface="Arial"/>
-              <a:buNone/>
+              <a:buChar char="•"/>
             </a:pPr>
             <a:r>
-              <a:rPr b="0" i="0" lang="en-US" sz="3200" u="none" cap="none" strike="noStrike">
+              <a:rPr b="1" i="0" lang="en-US" sz="3200" u="none" cap="none" strike="noStrike">
                 <a:solidFill>
                   <a:srgbClr val="000000"/>
                 </a:solidFill>
@@ -20228,7 +19948,247 @@
                 <a:cs typeface="Open Sans"/>
                 <a:sym typeface="Open Sans"/>
               </a:rPr>
-              <a:t>Kommunikációra használt alkalmazások</a:t>
+              <a:t>analitikák megtekintése</a:t>
+            </a:r>
+            <a:endParaRPr b="0" i="0" sz="1400" u="none" cap="none" strike="noStrike">
+              <a:solidFill>
+                <a:srgbClr val="000000"/>
+              </a:solidFill>
+              <a:latin typeface="Arial"/>
+              <a:ea typeface="Arial"/>
+              <a:cs typeface="Arial"/>
+              <a:sym typeface="Arial"/>
+            </a:endParaRPr>
+          </a:p>
+          <a:p>
+            <a:pPr indent="-345445" lvl="1" marL="690890" marR="0" rtl="0" algn="l">
+              <a:lnSpc>
+                <a:spcPct val="140000"/>
+              </a:lnSpc>
+              <a:spcBef>
+                <a:spcPts val="0"/>
+              </a:spcBef>
+              <a:spcAft>
+                <a:spcPts val="0"/>
+              </a:spcAft>
+              <a:buClr>
+                <a:srgbClr val="000000"/>
+              </a:buClr>
+              <a:buSzPts val="3200"/>
+              <a:buFont typeface="Arial"/>
+              <a:buChar char="•"/>
+            </a:pPr>
+            <a:r>
+              <a:rPr b="1" i="0" lang="en-US" sz="3200" u="none" cap="none" strike="noStrike">
+                <a:solidFill>
+                  <a:srgbClr val="000000"/>
+                </a:solidFill>
+                <a:latin typeface="Open Sans"/>
+                <a:ea typeface="Open Sans"/>
+                <a:cs typeface="Open Sans"/>
+                <a:sym typeface="Open Sans"/>
+              </a:rPr>
+              <a:t>projekt létrehozása</a:t>
+            </a:r>
+            <a:endParaRPr b="0" i="0" sz="1400" u="none" cap="none" strike="noStrike">
+              <a:solidFill>
+                <a:srgbClr val="000000"/>
+              </a:solidFill>
+              <a:latin typeface="Arial"/>
+              <a:ea typeface="Arial"/>
+              <a:cs typeface="Arial"/>
+              <a:sym typeface="Arial"/>
+            </a:endParaRPr>
+          </a:p>
+          <a:p>
+            <a:pPr indent="-345445" lvl="1" marL="690890" marR="0" rtl="0" algn="l">
+              <a:lnSpc>
+                <a:spcPct val="140000"/>
+              </a:lnSpc>
+              <a:spcBef>
+                <a:spcPts val="0"/>
+              </a:spcBef>
+              <a:spcAft>
+                <a:spcPts val="0"/>
+              </a:spcAft>
+              <a:buClr>
+                <a:srgbClr val="000000"/>
+              </a:buClr>
+              <a:buSzPts val="3200"/>
+              <a:buFont typeface="Arial"/>
+              <a:buChar char="•"/>
+            </a:pPr>
+            <a:r>
+              <a:rPr b="1" i="0" lang="en-US" sz="3200" u="none" cap="none" strike="noStrike">
+                <a:solidFill>
+                  <a:srgbClr val="000000"/>
+                </a:solidFill>
+                <a:latin typeface="Open Sans"/>
+                <a:ea typeface="Open Sans"/>
+                <a:cs typeface="Open Sans"/>
+                <a:sym typeface="Open Sans"/>
+              </a:rPr>
+              <a:t>feladatok létrehozása és kezelése</a:t>
+            </a:r>
+            <a:endParaRPr b="0" i="0" sz="1400" u="none" cap="none" strike="noStrike">
+              <a:solidFill>
+                <a:srgbClr val="000000"/>
+              </a:solidFill>
+              <a:latin typeface="Arial"/>
+              <a:ea typeface="Arial"/>
+              <a:cs typeface="Arial"/>
+              <a:sym typeface="Arial"/>
+            </a:endParaRPr>
+          </a:p>
+          <a:p>
+            <a:pPr indent="-345445" lvl="1" marL="690890" marR="0" rtl="0" algn="l">
+              <a:lnSpc>
+                <a:spcPct val="140000"/>
+              </a:lnSpc>
+              <a:spcBef>
+                <a:spcPts val="0"/>
+              </a:spcBef>
+              <a:spcAft>
+                <a:spcPts val="0"/>
+              </a:spcAft>
+              <a:buClr>
+                <a:srgbClr val="000000"/>
+              </a:buClr>
+              <a:buSzPts val="3200"/>
+              <a:buFont typeface="Arial"/>
+              <a:buChar char="•"/>
+            </a:pPr>
+            <a:r>
+              <a:rPr b="1" i="0" lang="en-US" sz="3200" u="none" cap="none" strike="noStrike">
+                <a:solidFill>
+                  <a:srgbClr val="000000"/>
+                </a:solidFill>
+                <a:latin typeface="Open Sans"/>
+                <a:ea typeface="Open Sans"/>
+                <a:cs typeface="Open Sans"/>
+                <a:sym typeface="Open Sans"/>
+              </a:rPr>
+              <a:t>csevegő felület</a:t>
+            </a:r>
+            <a:endParaRPr b="0" i="0" sz="1400" u="none" cap="none" strike="noStrike">
+              <a:solidFill>
+                <a:srgbClr val="000000"/>
+              </a:solidFill>
+              <a:latin typeface="Arial"/>
+              <a:ea typeface="Arial"/>
+              <a:cs typeface="Arial"/>
+              <a:sym typeface="Arial"/>
+            </a:endParaRPr>
+          </a:p>
+          <a:p>
+            <a:pPr indent="-345445" lvl="1" marL="690890" marR="0" rtl="0" algn="l">
+              <a:lnSpc>
+                <a:spcPct val="140000"/>
+              </a:lnSpc>
+              <a:spcBef>
+                <a:spcPts val="0"/>
+              </a:spcBef>
+              <a:spcAft>
+                <a:spcPts val="0"/>
+              </a:spcAft>
+              <a:buClr>
+                <a:srgbClr val="000000"/>
+              </a:buClr>
+              <a:buSzPts val="3200"/>
+              <a:buFont typeface="Arial"/>
+              <a:buChar char="•"/>
+            </a:pPr>
+            <a:r>
+              <a:rPr b="1" i="0" lang="en-US" sz="3200" u="none" cap="none" strike="noStrike">
+                <a:solidFill>
+                  <a:srgbClr val="000000"/>
+                </a:solidFill>
+                <a:latin typeface="Open Sans"/>
+                <a:ea typeface="Open Sans"/>
+                <a:cs typeface="Open Sans"/>
+                <a:sym typeface="Open Sans"/>
+              </a:rPr>
+              <a:t>problémák kezelése</a:t>
+            </a:r>
+            <a:endParaRPr b="0" i="0" sz="1400" u="none" cap="none" strike="noStrike">
+              <a:solidFill>
+                <a:srgbClr val="000000"/>
+              </a:solidFill>
+              <a:latin typeface="Arial"/>
+              <a:ea typeface="Arial"/>
+              <a:cs typeface="Arial"/>
+              <a:sym typeface="Arial"/>
+            </a:endParaRPr>
+          </a:p>
+          <a:p>
+            <a:pPr indent="-345445" lvl="1" marL="690890" marR="0" rtl="0" algn="l">
+              <a:lnSpc>
+                <a:spcPct val="140000"/>
+              </a:lnSpc>
+              <a:spcBef>
+                <a:spcPts val="0"/>
+              </a:spcBef>
+              <a:spcAft>
+                <a:spcPts val="0"/>
+              </a:spcAft>
+              <a:buClr>
+                <a:srgbClr val="000000"/>
+              </a:buClr>
+              <a:buSzPts val="3200"/>
+              <a:buFont typeface="Arial"/>
+              <a:buChar char="•"/>
+            </a:pPr>
+            <a:r>
+              <a:rPr b="1" i="0" lang="en-US" sz="3200" u="none" cap="none" strike="noStrike">
+                <a:solidFill>
+                  <a:srgbClr val="000000"/>
+                </a:solidFill>
+                <a:latin typeface="Open Sans"/>
+                <a:ea typeface="Open Sans"/>
+                <a:cs typeface="Open Sans"/>
+                <a:sym typeface="Open Sans"/>
+              </a:rPr>
+              <a:t>tagok felvétele</a:t>
+            </a:r>
+            <a:endParaRPr b="0" i="0" sz="1400" u="none" cap="none" strike="noStrike">
+              <a:solidFill>
+                <a:srgbClr val="000000"/>
+              </a:solidFill>
+              <a:latin typeface="Arial"/>
+              <a:ea typeface="Arial"/>
+              <a:cs typeface="Arial"/>
+              <a:sym typeface="Arial"/>
+            </a:endParaRPr>
+          </a:p>
+          <a:p>
+            <a:pPr indent="-345445" lvl="1" marL="690890" marR="0" rtl="0" algn="l">
+              <a:lnSpc>
+                <a:spcPct val="140000"/>
+              </a:lnSpc>
+              <a:spcBef>
+                <a:spcPts val="0"/>
+              </a:spcBef>
+              <a:spcAft>
+                <a:spcPts val="0"/>
+              </a:spcAft>
+              <a:buClr>
+                <a:srgbClr val="000000"/>
+              </a:buClr>
+              <a:buSzPts val="3200"/>
+              <a:buFont typeface="Arial"/>
+              <a:buChar char="•"/>
+            </a:pPr>
+            <a:r>
+              <a:rPr b="1" i="0" lang="en-US" sz="3200" u="none" cap="none" strike="noStrike">
+                <a:solidFill>
+                  <a:srgbClr val="000000"/>
+                </a:solidFill>
+                <a:latin typeface="Open Sans"/>
+                <a:ea typeface="Open Sans"/>
+                <a:cs typeface="Open Sans"/>
+                <a:sym typeface="Open Sans"/>
+              </a:rPr>
+              <a:t>projekt testreszabása </a:t>
             </a:r>
             <a:endParaRPr b="0" i="0" sz="1400" u="none" cap="none" strike="noStrike">
               <a:solidFill>
@@ -20250,7 +20210,7 @@
         </p:nvSpPr>
         <p:spPr>
           <a:xfrm>
-            <a:off x="1730080" y="5017240"/>
+            <a:off x="2338017" y="5225058"/>
             <a:ext cx="609484" cy="609484"/>
           </a:xfrm>
           <a:custGeom>
@@ -20261,10 +20221,10 @@
                   <a:pt x="0" y="0"/>
                 </a:moveTo>
                 <a:lnTo>
-                  <a:pt x="609484" y="0"/>
-                </a:lnTo>
-                <a:lnTo>
-                  <a:pt x="609484" y="609484"/>
+                  <a:pt x="609485" y="0"/>
+                </a:lnTo>
+                <a:lnTo>
+                  <a:pt x="609485" y="609484"/>
                 </a:lnTo>
                 <a:lnTo>
                   <a:pt x="0" y="609484"/>
@@ -20297,7 +20257,7 @@
         </p:nvSpPr>
         <p:spPr>
           <a:xfrm>
-            <a:off x="7963129" y="6512958"/>
+            <a:off x="11220599" y="8434204"/>
             <a:ext cx="609484" cy="609484"/>
           </a:xfrm>
           <a:custGeom>
@@ -20308,13 +20268,13 @@
                   <a:pt x="0" y="0"/>
                 </a:moveTo>
                 <a:lnTo>
-                  <a:pt x="609485" y="0"/>
-                </a:lnTo>
-                <a:lnTo>
-                  <a:pt x="609485" y="609484"/>
-                </a:lnTo>
-                <a:lnTo>
-                  <a:pt x="0" y="609484"/>
+                  <a:pt x="609484" y="0"/>
+                </a:lnTo>
+                <a:lnTo>
+                  <a:pt x="609484" y="609485"/>
+                </a:lnTo>
+                <a:lnTo>
+                  <a:pt x="0" y="609485"/>
                 </a:lnTo>
                 <a:lnTo>
                   <a:pt x="0" y="0"/>
@@ -20344,7 +20304,7 @@
         </p:nvSpPr>
         <p:spPr>
           <a:xfrm>
-            <a:off x="11320389" y="2656142"/>
+            <a:off x="9145091" y="2238995"/>
             <a:ext cx="609484" cy="609484"/>
           </a:xfrm>
           <a:custGeom>
@@ -20355,13 +20315,13 @@
                   <a:pt x="0" y="0"/>
                 </a:moveTo>
                 <a:lnTo>
-                  <a:pt x="609485" y="0"/>
-                </a:lnTo>
-                <a:lnTo>
-                  <a:pt x="609485" y="609484"/>
-                </a:lnTo>
-                <a:lnTo>
-                  <a:pt x="0" y="609484"/>
+                  <a:pt x="609484" y="0"/>
+                </a:lnTo>
+                <a:lnTo>
+                  <a:pt x="609484" y="609485"/>
+                </a:lnTo>
+                <a:lnTo>
+                  <a:pt x="0" y="609485"/>
                 </a:lnTo>
                 <a:lnTo>
                   <a:pt x="0" y="0"/>

</xml_diff>